<commit_message>
Creata struttura di base per la presentazione
</commit_message>
<xml_diff>
--- a/Documenti/OMA ASSIGNMENT 2014.pptx
+++ b/Documenti/OMA ASSIGNMENT 2014.pptx
@@ -5,7 +5,7 @@
     <p:sldMasterId id="2147483720" r:id="rId1"/>
   </p:sldMasterIdLst>
   <p:notesMasterIdLst>
-    <p:notesMasterId r:id="rId10"/>
+    <p:notesMasterId r:id="rId17"/>
   </p:notesMasterIdLst>
   <p:sldIdLst>
     <p:sldId id="256" r:id="rId2"/>
@@ -16,6 +16,13 @@
     <p:sldId id="261" r:id="rId7"/>
     <p:sldId id="262" r:id="rId8"/>
     <p:sldId id="263" r:id="rId9"/>
+    <p:sldId id="264" r:id="rId10"/>
+    <p:sldId id="265" r:id="rId11"/>
+    <p:sldId id="266" r:id="rId12"/>
+    <p:sldId id="267" r:id="rId13"/>
+    <p:sldId id="268" r:id="rId14"/>
+    <p:sldId id="269" r:id="rId15"/>
+    <p:sldId id="270" r:id="rId16"/>
   </p:sldIdLst>
   <p:sldSz cx="9144000" cy="6858000" type="screen4x3"/>
   <p:notesSz cx="6858000" cy="9144000"/>
@@ -1885,6 +1892,13 @@
         </dgm:presLayoutVars>
       </dgm:prSet>
       <dgm:spPr/>
+      <dgm:t>
+        <a:bodyPr/>
+        <a:lstStyle/>
+        <a:p>
+          <a:endParaRPr lang="en-GB"/>
+        </a:p>
+      </dgm:t>
     </dgm:pt>
     <dgm:pt modelId="{24FA96D1-ACBC-41B2-96A4-2CAFC5082563}" type="pres">
       <dgm:prSet presAssocID="{33B0873A-D885-4325-961B-F1D834ADB0F7}" presName="composite" presStyleCnt="0"/>
@@ -1903,6 +1917,13 @@
         </dgm:presLayoutVars>
       </dgm:prSet>
       <dgm:spPr/>
+      <dgm:t>
+        <a:bodyPr/>
+        <a:lstStyle/>
+        <a:p>
+          <a:endParaRPr lang="en-GB"/>
+        </a:p>
+      </dgm:t>
     </dgm:pt>
     <dgm:pt modelId="{E2EA7465-332E-43A0-B525-87E18862AAB7}" type="pres">
       <dgm:prSet presAssocID="{33B0873A-D885-4325-961B-F1D834ADB0F7}" presName="ChildText" presStyleLbl="revTx" presStyleIdx="0" presStyleCnt="3" custScaleX="458721" custLinFactX="90457" custLinFactNeighborX="100000" custLinFactNeighborY="399">
@@ -1942,6 +1963,13 @@
         </dgm:presLayoutVars>
       </dgm:prSet>
       <dgm:spPr/>
+      <dgm:t>
+        <a:bodyPr/>
+        <a:lstStyle/>
+        <a:p>
+          <a:endParaRPr lang="en-GB"/>
+        </a:p>
+      </dgm:t>
     </dgm:pt>
     <dgm:pt modelId="{42BC6418-9390-4DBB-B8A4-FECC20CDFAA2}" type="pres">
       <dgm:prSet presAssocID="{79462E9F-3A79-427F-A85D-BA736E49A4FE}" presName="ChildText" presStyleLbl="revTx" presStyleIdx="1" presStyleCnt="3" custScaleX="264452" custLinFactNeighborX="91535" custLinFactNeighborY="4306">
@@ -1952,6 +1980,13 @@
         </dgm:presLayoutVars>
       </dgm:prSet>
       <dgm:spPr/>
+      <dgm:t>
+        <a:bodyPr/>
+        <a:lstStyle/>
+        <a:p>
+          <a:endParaRPr lang="en-GB"/>
+        </a:p>
+      </dgm:t>
     </dgm:pt>
     <dgm:pt modelId="{B3C7EBF0-F6E1-4681-A414-9C908048731A}" type="pres">
       <dgm:prSet presAssocID="{06CF495E-3BA4-42D9-BA2C-70F8044CC436}" presName="sibTrans" presStyleCnt="0"/>
@@ -1970,6 +2005,13 @@
         </dgm:presLayoutVars>
       </dgm:prSet>
       <dgm:spPr/>
+      <dgm:t>
+        <a:bodyPr/>
+        <a:lstStyle/>
+        <a:p>
+          <a:endParaRPr lang="en-GB"/>
+        </a:p>
+      </dgm:t>
     </dgm:pt>
     <dgm:pt modelId="{3BE3B7D4-392F-432B-B794-D470CC2C8CC7}" type="pres">
       <dgm:prSet presAssocID="{1AF360A8-881C-4035-BA91-7780773AD6B7}" presName="FinalChildText" presStyleLbl="revTx" presStyleIdx="2" presStyleCnt="3" custScaleX="119084">
@@ -1980,6 +2022,13 @@
         </dgm:presLayoutVars>
       </dgm:prSet>
       <dgm:spPr/>
+      <dgm:t>
+        <a:bodyPr/>
+        <a:lstStyle/>
+        <a:p>
+          <a:endParaRPr lang="en-GB"/>
+        </a:p>
+      </dgm:t>
     </dgm:pt>
   </dgm:ptLst>
   <dgm:cxnLst>
@@ -2236,6 +2285,13 @@
         </dgm:presLayoutVars>
       </dgm:prSet>
       <dgm:spPr/>
+      <dgm:t>
+        <a:bodyPr/>
+        <a:lstStyle/>
+        <a:p>
+          <a:endParaRPr lang="en-GB"/>
+        </a:p>
+      </dgm:t>
     </dgm:pt>
     <dgm:pt modelId="{CFEBA8CE-91C8-4314-A0C5-8EC89B5BC4C4}" type="pres">
       <dgm:prSet presAssocID="{BE485E1F-F886-4F26-ACDF-2DFA36BB7733}" presName="dummyMaxCanvas" presStyleCnt="0">
@@ -2250,6 +2306,13 @@
         </dgm:presLayoutVars>
       </dgm:prSet>
       <dgm:spPr/>
+      <dgm:t>
+        <a:bodyPr/>
+        <a:lstStyle/>
+        <a:p>
+          <a:endParaRPr lang="en-GB"/>
+        </a:p>
+      </dgm:t>
     </dgm:pt>
     <dgm:pt modelId="{92AF59CF-48F8-4268-A79E-CC79582F4969}" type="pres">
       <dgm:prSet presAssocID="{BE485E1F-F886-4F26-ACDF-2DFA36BB7733}" presName="FiveNodes_2" presStyleLbl="node1" presStyleIdx="1" presStyleCnt="5">
@@ -2258,6 +2321,13 @@
         </dgm:presLayoutVars>
       </dgm:prSet>
       <dgm:spPr/>
+      <dgm:t>
+        <a:bodyPr/>
+        <a:lstStyle/>
+        <a:p>
+          <a:endParaRPr lang="en-GB"/>
+        </a:p>
+      </dgm:t>
     </dgm:pt>
     <dgm:pt modelId="{FF7D625B-094E-47B2-AC42-C63EB26F8A41}" type="pres">
       <dgm:prSet presAssocID="{BE485E1F-F886-4F26-ACDF-2DFA36BB7733}" presName="FiveNodes_3" presStyleLbl="node1" presStyleIdx="2" presStyleCnt="5">
@@ -2266,6 +2336,13 @@
         </dgm:presLayoutVars>
       </dgm:prSet>
       <dgm:spPr/>
+      <dgm:t>
+        <a:bodyPr/>
+        <a:lstStyle/>
+        <a:p>
+          <a:endParaRPr lang="en-GB"/>
+        </a:p>
+      </dgm:t>
     </dgm:pt>
     <dgm:pt modelId="{4FAB4D36-5479-4F26-B89E-4280791CA0D6}" type="pres">
       <dgm:prSet presAssocID="{BE485E1F-F886-4F26-ACDF-2DFA36BB7733}" presName="FiveNodes_4" presStyleLbl="node1" presStyleIdx="3" presStyleCnt="5">
@@ -2274,6 +2351,13 @@
         </dgm:presLayoutVars>
       </dgm:prSet>
       <dgm:spPr/>
+      <dgm:t>
+        <a:bodyPr/>
+        <a:lstStyle/>
+        <a:p>
+          <a:endParaRPr lang="en-GB"/>
+        </a:p>
+      </dgm:t>
     </dgm:pt>
     <dgm:pt modelId="{E2DDE62C-6449-4F97-BFE3-AD8BBC91A48E}" type="pres">
       <dgm:prSet presAssocID="{BE485E1F-F886-4F26-ACDF-2DFA36BB7733}" presName="FiveNodes_5" presStyleLbl="node1" presStyleIdx="4" presStyleCnt="5">
@@ -2282,6 +2366,13 @@
         </dgm:presLayoutVars>
       </dgm:prSet>
       <dgm:spPr/>
+      <dgm:t>
+        <a:bodyPr/>
+        <a:lstStyle/>
+        <a:p>
+          <a:endParaRPr lang="en-GB"/>
+        </a:p>
+      </dgm:t>
     </dgm:pt>
     <dgm:pt modelId="{EA8B9983-0FD4-43FD-8218-7F6BE9F193B4}" type="pres">
       <dgm:prSet presAssocID="{BE485E1F-F886-4F26-ACDF-2DFA36BB7733}" presName="FiveConn_1-2" presStyleLbl="fgAccFollowNode1" presStyleIdx="0" presStyleCnt="4">
@@ -2290,6 +2381,13 @@
         </dgm:presLayoutVars>
       </dgm:prSet>
       <dgm:spPr/>
+      <dgm:t>
+        <a:bodyPr/>
+        <a:lstStyle/>
+        <a:p>
+          <a:endParaRPr lang="en-GB"/>
+        </a:p>
+      </dgm:t>
     </dgm:pt>
     <dgm:pt modelId="{FCD10D03-9EAF-4D23-82BF-B80666E9DC6B}" type="pres">
       <dgm:prSet presAssocID="{BE485E1F-F886-4F26-ACDF-2DFA36BB7733}" presName="FiveConn_2-3" presStyleLbl="fgAccFollowNode1" presStyleIdx="1" presStyleCnt="4">
@@ -2298,6 +2396,13 @@
         </dgm:presLayoutVars>
       </dgm:prSet>
       <dgm:spPr/>
+      <dgm:t>
+        <a:bodyPr/>
+        <a:lstStyle/>
+        <a:p>
+          <a:endParaRPr lang="en-GB"/>
+        </a:p>
+      </dgm:t>
     </dgm:pt>
     <dgm:pt modelId="{2FB51C4A-999E-4D33-B563-183F6B3E6840}" type="pres">
       <dgm:prSet presAssocID="{BE485E1F-F886-4F26-ACDF-2DFA36BB7733}" presName="FiveConn_3-4" presStyleLbl="fgAccFollowNode1" presStyleIdx="2" presStyleCnt="4">
@@ -2306,6 +2411,13 @@
         </dgm:presLayoutVars>
       </dgm:prSet>
       <dgm:spPr/>
+      <dgm:t>
+        <a:bodyPr/>
+        <a:lstStyle/>
+        <a:p>
+          <a:endParaRPr lang="en-GB"/>
+        </a:p>
+      </dgm:t>
     </dgm:pt>
     <dgm:pt modelId="{EE172B0B-ACBD-41B7-86E2-6B7178EB9238}" type="pres">
       <dgm:prSet presAssocID="{BE485E1F-F886-4F26-ACDF-2DFA36BB7733}" presName="FiveConn_4-5" presStyleLbl="fgAccFollowNode1" presStyleIdx="3" presStyleCnt="4">
@@ -2314,6 +2426,13 @@
         </dgm:presLayoutVars>
       </dgm:prSet>
       <dgm:spPr/>
+      <dgm:t>
+        <a:bodyPr/>
+        <a:lstStyle/>
+        <a:p>
+          <a:endParaRPr lang="en-GB"/>
+        </a:p>
+      </dgm:t>
     </dgm:pt>
     <dgm:pt modelId="{D7492366-550F-4223-A7F3-B4B2B56F5DD4}" type="pres">
       <dgm:prSet presAssocID="{BE485E1F-F886-4F26-ACDF-2DFA36BB7733}" presName="FiveNodes_1_text" presStyleLbl="node1" presStyleIdx="4" presStyleCnt="5">
@@ -2322,6 +2441,13 @@
         </dgm:presLayoutVars>
       </dgm:prSet>
       <dgm:spPr/>
+      <dgm:t>
+        <a:bodyPr/>
+        <a:lstStyle/>
+        <a:p>
+          <a:endParaRPr lang="en-GB"/>
+        </a:p>
+      </dgm:t>
     </dgm:pt>
     <dgm:pt modelId="{86392F22-E787-4698-9F59-E29A1C32BC96}" type="pres">
       <dgm:prSet presAssocID="{BE485E1F-F886-4F26-ACDF-2DFA36BB7733}" presName="FiveNodes_2_text" presStyleLbl="node1" presStyleIdx="4" presStyleCnt="5">
@@ -2330,6 +2456,13 @@
         </dgm:presLayoutVars>
       </dgm:prSet>
       <dgm:spPr/>
+      <dgm:t>
+        <a:bodyPr/>
+        <a:lstStyle/>
+        <a:p>
+          <a:endParaRPr lang="en-GB"/>
+        </a:p>
+      </dgm:t>
     </dgm:pt>
     <dgm:pt modelId="{A42E2180-F200-45A5-AB75-CAF51EE6C5B0}" type="pres">
       <dgm:prSet presAssocID="{BE485E1F-F886-4F26-ACDF-2DFA36BB7733}" presName="FiveNodes_3_text" presStyleLbl="node1" presStyleIdx="4" presStyleCnt="5">
@@ -2338,6 +2471,13 @@
         </dgm:presLayoutVars>
       </dgm:prSet>
       <dgm:spPr/>
+      <dgm:t>
+        <a:bodyPr/>
+        <a:lstStyle/>
+        <a:p>
+          <a:endParaRPr lang="en-GB"/>
+        </a:p>
+      </dgm:t>
     </dgm:pt>
     <dgm:pt modelId="{7D06ECCE-5888-4DDC-98BC-3D6CA712E43E}" type="pres">
       <dgm:prSet presAssocID="{BE485E1F-F886-4F26-ACDF-2DFA36BB7733}" presName="FiveNodes_4_text" presStyleLbl="node1" presStyleIdx="4" presStyleCnt="5">
@@ -2346,6 +2486,13 @@
         </dgm:presLayoutVars>
       </dgm:prSet>
       <dgm:spPr/>
+      <dgm:t>
+        <a:bodyPr/>
+        <a:lstStyle/>
+        <a:p>
+          <a:endParaRPr lang="en-GB"/>
+        </a:p>
+      </dgm:t>
     </dgm:pt>
     <dgm:pt modelId="{6F43AEE5-4C71-4632-9E5C-DC511C475EF7}" type="pres">
       <dgm:prSet presAssocID="{BE485E1F-F886-4F26-ACDF-2DFA36BB7733}" presName="FiveNodes_5_text" presStyleLbl="node1" presStyleIdx="4" presStyleCnt="5">
@@ -2354,29 +2501,36 @@
         </dgm:presLayoutVars>
       </dgm:prSet>
       <dgm:spPr/>
+      <dgm:t>
+        <a:bodyPr/>
+        <a:lstStyle/>
+        <a:p>
+          <a:endParaRPr lang="en-GB"/>
+        </a:p>
+      </dgm:t>
     </dgm:pt>
   </dgm:ptLst>
   <dgm:cxnLst>
+    <dgm:cxn modelId="{E57583D0-6809-466E-997B-744E2B77655E}" type="presOf" srcId="{97957167-7886-4D65-846C-E2595B498110}" destId="{76FE4E92-AAF9-42F0-B6F2-E76B437DC092}" srcOrd="0" destOrd="0" presId="urn:microsoft.com/office/officeart/2005/8/layout/vProcess5"/>
+    <dgm:cxn modelId="{37F06924-22AD-4987-8345-6D8BF9DE57D9}" type="presOf" srcId="{D0B3B1A4-01C5-45CB-BF57-C362245F5F62}" destId="{2FB51C4A-999E-4D33-B563-183F6B3E6840}" srcOrd="0" destOrd="0" presId="urn:microsoft.com/office/officeart/2005/8/layout/vProcess5"/>
+    <dgm:cxn modelId="{A489954F-919C-4CBA-A0C7-AB3B583F3BDF}" srcId="{BE485E1F-F886-4F26-ACDF-2DFA36BB7733}" destId="{6158E161-7435-4A74-BF08-FA9F23065C71}" srcOrd="2" destOrd="0" parTransId="{B410838C-D402-4AA7-9149-B5CAB148FE0E}" sibTransId="{D0B3B1A4-01C5-45CB-BF57-C362245F5F62}"/>
+    <dgm:cxn modelId="{FC028CE6-17E2-4150-933C-607E601F9C08}" type="presOf" srcId="{3FABE830-E235-4C02-9E45-7C3F529D6900}" destId="{92AF59CF-48F8-4268-A79E-CC79582F4969}" srcOrd="0" destOrd="0" presId="urn:microsoft.com/office/officeart/2005/8/layout/vProcess5"/>
+    <dgm:cxn modelId="{5FC2B1DA-DBDD-4FDD-8BAA-4B51FA782E22}" type="presOf" srcId="{BE485E1F-F886-4F26-ACDF-2DFA36BB7733}" destId="{E18ED1D9-9DB5-4826-9D2D-64E25E707FD7}" srcOrd="0" destOrd="0" presId="urn:microsoft.com/office/officeart/2005/8/layout/vProcess5"/>
+    <dgm:cxn modelId="{EE704841-F39C-4266-ACE4-BF3CA602F5D0}" type="presOf" srcId="{0915E0BA-0762-4FDB-B3EE-105168C26BA3}" destId="{EE172B0B-ACBD-41B7-86E2-6B7178EB9238}" srcOrd="0" destOrd="0" presId="urn:microsoft.com/office/officeart/2005/8/layout/vProcess5"/>
+    <dgm:cxn modelId="{6C8B9469-F342-425D-AD1A-2CE8A95AFF0C}" srcId="{BE485E1F-F886-4F26-ACDF-2DFA36BB7733}" destId="{3FABE830-E235-4C02-9E45-7C3F529D6900}" srcOrd="1" destOrd="0" parTransId="{423DA3A5-58CE-4814-8AC8-8634A59A5A12}" sibTransId="{DDB7A745-BCB6-411B-8ED1-AD37E95B5D22}"/>
+    <dgm:cxn modelId="{91C34DFB-E600-4851-9FFE-1C8CBE0A1BF8}" type="presOf" srcId="{0CB8CDE1-D7BA-4493-823D-ED129D6A5AD9}" destId="{E2DDE62C-6449-4F97-BFE3-AD8BBC91A48E}" srcOrd="0" destOrd="0" presId="urn:microsoft.com/office/officeart/2005/8/layout/vProcess5"/>
+    <dgm:cxn modelId="{0BEA4781-AB39-4E49-9799-91370AF9CF5C}" type="presOf" srcId="{97957167-7886-4D65-846C-E2595B498110}" destId="{D7492366-550F-4223-A7F3-B4B2B56F5DD4}" srcOrd="1" destOrd="0" presId="urn:microsoft.com/office/officeart/2005/8/layout/vProcess5"/>
+    <dgm:cxn modelId="{125250D2-8783-4E07-B2D4-2A30AC7F01C9}" type="presOf" srcId="{FDFBB22A-0836-4E19-9435-AD6F3CEBF772}" destId="{4FAB4D36-5479-4F26-B89E-4280791CA0D6}" srcOrd="0" destOrd="0" presId="urn:microsoft.com/office/officeart/2005/8/layout/vProcess5"/>
+    <dgm:cxn modelId="{21E92FDC-1FF6-48E6-AA7E-6CCF0D7A04A7}" type="presOf" srcId="{FDFBB22A-0836-4E19-9435-AD6F3CEBF772}" destId="{7D06ECCE-5888-4DDC-98BC-3D6CA712E43E}" srcOrd="1" destOrd="0" presId="urn:microsoft.com/office/officeart/2005/8/layout/vProcess5"/>
+    <dgm:cxn modelId="{7779FD5E-B1CE-4B52-B1B1-BD75DDD2C2F7}" type="presOf" srcId="{3FABE830-E235-4C02-9E45-7C3F529D6900}" destId="{86392F22-E787-4698-9F59-E29A1C32BC96}" srcOrd="1" destOrd="0" presId="urn:microsoft.com/office/officeart/2005/8/layout/vProcess5"/>
+    <dgm:cxn modelId="{C501E6CF-D05B-499E-84CD-C3048F212F40}" type="presOf" srcId="{0CB8CDE1-D7BA-4493-823D-ED129D6A5AD9}" destId="{6F43AEE5-4C71-4632-9E5C-DC511C475EF7}" srcOrd="1" destOrd="0" presId="urn:microsoft.com/office/officeart/2005/8/layout/vProcess5"/>
+    <dgm:cxn modelId="{A29471BC-7C92-42BF-ABDF-724704F00D57}" type="presOf" srcId="{6158E161-7435-4A74-BF08-FA9F23065C71}" destId="{FF7D625B-094E-47B2-AC42-C63EB26F8A41}" srcOrd="0" destOrd="0" presId="urn:microsoft.com/office/officeart/2005/8/layout/vProcess5"/>
     <dgm:cxn modelId="{55551DAC-3E8A-4DB0-9C1D-E125E15F29C6}" srcId="{BE485E1F-F886-4F26-ACDF-2DFA36BB7733}" destId="{FDFBB22A-0836-4E19-9435-AD6F3CEBF772}" srcOrd="3" destOrd="0" parTransId="{1747BC5D-6EC8-48A3-BC21-59FA00653999}" sibTransId="{0915E0BA-0762-4FDB-B3EE-105168C26BA3}"/>
-    <dgm:cxn modelId="{5FC2B1DA-DBDD-4FDD-8BAA-4B51FA782E22}" type="presOf" srcId="{BE485E1F-F886-4F26-ACDF-2DFA36BB7733}" destId="{E18ED1D9-9DB5-4826-9D2D-64E25E707FD7}" srcOrd="0" destOrd="0" presId="urn:microsoft.com/office/officeart/2005/8/layout/vProcess5"/>
-    <dgm:cxn modelId="{A489954F-919C-4CBA-A0C7-AB3B583F3BDF}" srcId="{BE485E1F-F886-4F26-ACDF-2DFA36BB7733}" destId="{6158E161-7435-4A74-BF08-FA9F23065C71}" srcOrd="2" destOrd="0" parTransId="{B410838C-D402-4AA7-9149-B5CAB148FE0E}" sibTransId="{D0B3B1A4-01C5-45CB-BF57-C362245F5F62}"/>
-    <dgm:cxn modelId="{37F06924-22AD-4987-8345-6D8BF9DE57D9}" type="presOf" srcId="{D0B3B1A4-01C5-45CB-BF57-C362245F5F62}" destId="{2FB51C4A-999E-4D33-B563-183F6B3E6840}" srcOrd="0" destOrd="0" presId="urn:microsoft.com/office/officeart/2005/8/layout/vProcess5"/>
-    <dgm:cxn modelId="{C501E6CF-D05B-499E-84CD-C3048F212F40}" type="presOf" srcId="{0CB8CDE1-D7BA-4493-823D-ED129D6A5AD9}" destId="{6F43AEE5-4C71-4632-9E5C-DC511C475EF7}" srcOrd="1" destOrd="0" presId="urn:microsoft.com/office/officeart/2005/8/layout/vProcess5"/>
-    <dgm:cxn modelId="{6C8B9469-F342-425D-AD1A-2CE8A95AFF0C}" srcId="{BE485E1F-F886-4F26-ACDF-2DFA36BB7733}" destId="{3FABE830-E235-4C02-9E45-7C3F529D6900}" srcOrd="1" destOrd="0" parTransId="{423DA3A5-58CE-4814-8AC8-8634A59A5A12}" sibTransId="{DDB7A745-BCB6-411B-8ED1-AD37E95B5D22}"/>
+    <dgm:cxn modelId="{90AA7DEF-A8D1-441D-BDA9-2CF20D6B432A}" type="presOf" srcId="{DDB7A745-BCB6-411B-8ED1-AD37E95B5D22}" destId="{FCD10D03-9EAF-4D23-82BF-B80666E9DC6B}" srcOrd="0" destOrd="0" presId="urn:microsoft.com/office/officeart/2005/8/layout/vProcess5"/>
+    <dgm:cxn modelId="{C71A344F-37C9-4E4E-8AC5-60DFB78E7351}" type="presOf" srcId="{6158E161-7435-4A74-BF08-FA9F23065C71}" destId="{A42E2180-F200-45A5-AB75-CAF51EE6C5B0}" srcOrd="1" destOrd="0" presId="urn:microsoft.com/office/officeart/2005/8/layout/vProcess5"/>
+    <dgm:cxn modelId="{E48B5462-6545-4DC6-89C1-36B5D4A82986}" srcId="{BE485E1F-F886-4F26-ACDF-2DFA36BB7733}" destId="{97957167-7886-4D65-846C-E2595B498110}" srcOrd="0" destOrd="0" parTransId="{E34430E1-D457-42F4-B7B2-B7F8D24B864F}" sibTransId="{F76CD24A-3E43-41B4-9885-CA558F9DB00A}"/>
     <dgm:cxn modelId="{F836BC22-338F-4D93-B6C7-8EE614B213B1}" srcId="{BE485E1F-F886-4F26-ACDF-2DFA36BB7733}" destId="{0CB8CDE1-D7BA-4493-823D-ED129D6A5AD9}" srcOrd="4" destOrd="0" parTransId="{D040C11A-5548-4CAF-9063-5359D79522C9}" sibTransId="{A6491558-0F83-491B-BC35-515761A6BC1D}"/>
-    <dgm:cxn modelId="{C71A344F-37C9-4E4E-8AC5-60DFB78E7351}" type="presOf" srcId="{6158E161-7435-4A74-BF08-FA9F23065C71}" destId="{A42E2180-F200-45A5-AB75-CAF51EE6C5B0}" srcOrd="1" destOrd="0" presId="urn:microsoft.com/office/officeart/2005/8/layout/vProcess5"/>
-    <dgm:cxn modelId="{E57583D0-6809-466E-997B-744E2B77655E}" type="presOf" srcId="{97957167-7886-4D65-846C-E2595B498110}" destId="{76FE4E92-AAF9-42F0-B6F2-E76B437DC092}" srcOrd="0" destOrd="0" presId="urn:microsoft.com/office/officeart/2005/8/layout/vProcess5"/>
-    <dgm:cxn modelId="{21E92FDC-1FF6-48E6-AA7E-6CCF0D7A04A7}" type="presOf" srcId="{FDFBB22A-0836-4E19-9435-AD6F3CEBF772}" destId="{7D06ECCE-5888-4DDC-98BC-3D6CA712E43E}" srcOrd="1" destOrd="0" presId="urn:microsoft.com/office/officeart/2005/8/layout/vProcess5"/>
-    <dgm:cxn modelId="{E48B5462-6545-4DC6-89C1-36B5D4A82986}" srcId="{BE485E1F-F886-4F26-ACDF-2DFA36BB7733}" destId="{97957167-7886-4D65-846C-E2595B498110}" srcOrd="0" destOrd="0" parTransId="{E34430E1-D457-42F4-B7B2-B7F8D24B864F}" sibTransId="{F76CD24A-3E43-41B4-9885-CA558F9DB00A}"/>
-    <dgm:cxn modelId="{125250D2-8783-4E07-B2D4-2A30AC7F01C9}" type="presOf" srcId="{FDFBB22A-0836-4E19-9435-AD6F3CEBF772}" destId="{4FAB4D36-5479-4F26-B89E-4280791CA0D6}" srcOrd="0" destOrd="0" presId="urn:microsoft.com/office/officeart/2005/8/layout/vProcess5"/>
-    <dgm:cxn modelId="{A29471BC-7C92-42BF-ABDF-724704F00D57}" type="presOf" srcId="{6158E161-7435-4A74-BF08-FA9F23065C71}" destId="{FF7D625B-094E-47B2-AC42-C63EB26F8A41}" srcOrd="0" destOrd="0" presId="urn:microsoft.com/office/officeart/2005/8/layout/vProcess5"/>
-    <dgm:cxn modelId="{EE704841-F39C-4266-ACE4-BF3CA602F5D0}" type="presOf" srcId="{0915E0BA-0762-4FDB-B3EE-105168C26BA3}" destId="{EE172B0B-ACBD-41B7-86E2-6B7178EB9238}" srcOrd="0" destOrd="0" presId="urn:microsoft.com/office/officeart/2005/8/layout/vProcess5"/>
-    <dgm:cxn modelId="{0BEA4781-AB39-4E49-9799-91370AF9CF5C}" type="presOf" srcId="{97957167-7886-4D65-846C-E2595B498110}" destId="{D7492366-550F-4223-A7F3-B4B2B56F5DD4}" srcOrd="1" destOrd="0" presId="urn:microsoft.com/office/officeart/2005/8/layout/vProcess5"/>
-    <dgm:cxn modelId="{91C34DFB-E600-4851-9FFE-1C8CBE0A1BF8}" type="presOf" srcId="{0CB8CDE1-D7BA-4493-823D-ED129D6A5AD9}" destId="{E2DDE62C-6449-4F97-BFE3-AD8BBC91A48E}" srcOrd="0" destOrd="0" presId="urn:microsoft.com/office/officeart/2005/8/layout/vProcess5"/>
-    <dgm:cxn modelId="{7779FD5E-B1CE-4B52-B1B1-BD75DDD2C2F7}" type="presOf" srcId="{3FABE830-E235-4C02-9E45-7C3F529D6900}" destId="{86392F22-E787-4698-9F59-E29A1C32BC96}" srcOrd="1" destOrd="0" presId="urn:microsoft.com/office/officeart/2005/8/layout/vProcess5"/>
     <dgm:cxn modelId="{29E74C71-F6FD-4BCA-A79E-6A8F9010C649}" type="presOf" srcId="{F76CD24A-3E43-41B4-9885-CA558F9DB00A}" destId="{EA8B9983-0FD4-43FD-8218-7F6BE9F193B4}" srcOrd="0" destOrd="0" presId="urn:microsoft.com/office/officeart/2005/8/layout/vProcess5"/>
-    <dgm:cxn modelId="{90AA7DEF-A8D1-441D-BDA9-2CF20D6B432A}" type="presOf" srcId="{DDB7A745-BCB6-411B-8ED1-AD37E95B5D22}" destId="{FCD10D03-9EAF-4D23-82BF-B80666E9DC6B}" srcOrd="0" destOrd="0" presId="urn:microsoft.com/office/officeart/2005/8/layout/vProcess5"/>
-    <dgm:cxn modelId="{FC028CE6-17E2-4150-933C-607E601F9C08}" type="presOf" srcId="{3FABE830-E235-4C02-9E45-7C3F529D6900}" destId="{92AF59CF-48F8-4268-A79E-CC79582F4969}" srcOrd="0" destOrd="0" presId="urn:microsoft.com/office/officeart/2005/8/layout/vProcess5"/>
     <dgm:cxn modelId="{22C452D8-4F0D-46A0-81F1-7D8DA498487F}" type="presParOf" srcId="{E18ED1D9-9DB5-4826-9D2D-64E25E707FD7}" destId="{CFEBA8CE-91C8-4314-A0C5-8EC89B5BC4C4}" srcOrd="0" destOrd="0" presId="urn:microsoft.com/office/officeart/2005/8/layout/vProcess5"/>
     <dgm:cxn modelId="{215F3F75-5C02-4399-90DD-DA807918C4E0}" type="presParOf" srcId="{E18ED1D9-9DB5-4826-9D2D-64E25E707FD7}" destId="{76FE4E92-AAF9-42F0-B6F2-E76B437DC092}" srcOrd="1" destOrd="0" presId="urn:microsoft.com/office/officeart/2005/8/layout/vProcess5"/>
     <dgm:cxn modelId="{51104484-1B74-4F0C-94FC-D0995730C084}" type="presParOf" srcId="{E18ED1D9-9DB5-4826-9D2D-64E25E707FD7}" destId="{92AF59CF-48F8-4268-A79E-CC79582F4969}" srcOrd="2" destOrd="0" presId="urn:microsoft.com/office/officeart/2005/8/layout/vProcess5"/>
@@ -8017,7 +8171,11 @@
           <a:p>
             <a:r>
               <a:rPr lang="en-GB" dirty="0" smtClean="0"/>
-              <a:t>So our algorithm is a hybrid genetic – </a:t>
+              <a:t>Our solution is implemented with </a:t>
+            </a:r>
+            <a:r>
+              <a:rPr lang="en-GB" dirty="0" smtClean="0"/>
+              <a:t>a hybrid genetic – </a:t>
             </a:r>
             <a:r>
               <a:rPr lang="en-GB" dirty="0" err="1" smtClean="0"/>
@@ -13306,6 +13464,519 @@
 </p:sld>
 </file>
 
+<file path=ppt/slides/slide10.xml><?xml version="1.0" encoding="utf-8"?>
+<p:sld xmlns:a="http://schemas.openxmlformats.org/drawingml/2006/main" xmlns:r="http://schemas.openxmlformats.org/officeDocument/2006/relationships" xmlns:p="http://schemas.openxmlformats.org/presentationml/2006/main">
+  <p:cSld>
+    <p:spTree>
+      <p:nvGrpSpPr>
+        <p:cNvPr id="1" name=""/>
+        <p:cNvGrpSpPr/>
+        <p:nvPr/>
+      </p:nvGrpSpPr>
+      <p:grpSpPr>
+        <a:xfrm>
+          <a:off x="0" y="0"/>
+          <a:ext cx="0" cy="0"/>
+          <a:chOff x="0" y="0"/>
+          <a:chExt cx="0" cy="0"/>
+        </a:xfrm>
+      </p:grpSpPr>
+      <p:sp>
+        <p:nvSpPr>
+          <p:cNvPr id="2" name="Titolo 1"/>
+          <p:cNvSpPr>
+            <a:spLocks noGrp="1"/>
+          </p:cNvSpPr>
+          <p:nvPr>
+            <p:ph type="title"/>
+          </p:nvPr>
+        </p:nvSpPr>
+        <p:spPr/>
+        <p:txBody>
+          <a:bodyPr/>
+          <a:lstStyle/>
+          <a:p>
+            <a:r>
+              <a:rPr lang="en-GB" dirty="0" smtClean="0"/>
+              <a:t>The fitness function</a:t>
+            </a:r>
+            <a:endParaRPr lang="en-GB" dirty="0"/>
+          </a:p>
+        </p:txBody>
+      </p:sp>
+      <p:sp>
+        <p:nvSpPr>
+          <p:cNvPr id="3" name="Segnaposto contenuto 2"/>
+          <p:cNvSpPr>
+            <a:spLocks noGrp="1"/>
+          </p:cNvSpPr>
+          <p:nvPr>
+            <p:ph sz="quarter" idx="1"/>
+          </p:nvPr>
+        </p:nvSpPr>
+        <p:spPr/>
+        <p:txBody>
+          <a:bodyPr/>
+          <a:lstStyle/>
+          <a:p>
+            <a:pPr marL="0" indent="0">
+              <a:buNone/>
+            </a:pPr>
+            <a:r>
+              <a:rPr lang="en-GB" dirty="0" smtClean="0"/>
+              <a:t>The fitness function we implemented evaluates the cost of a given solution by computing the sum of the total distance covered by all of the routes.</a:t>
+            </a:r>
+          </a:p>
+          <a:p>
+            <a:pPr marL="0" indent="0">
+              <a:buNone/>
+            </a:pPr>
+            <a:endParaRPr lang="en-GB" dirty="0"/>
+          </a:p>
+          <a:p>
+            <a:pPr marL="0" indent="0">
+              <a:buNone/>
+            </a:pPr>
+            <a:r>
+              <a:rPr lang="en-GB" dirty="0" smtClean="0"/>
+              <a:t>The distance between two customers is computed as the sum of the distance between their position in space, and the distance between the midpoints of their time windows.</a:t>
+            </a:r>
+            <a:endParaRPr lang="en-GB" dirty="0"/>
+          </a:p>
+        </p:txBody>
+      </p:sp>
+    </p:spTree>
+    <p:extLst>
+      <p:ext uri="{BB962C8B-B14F-4D97-AF65-F5344CB8AC3E}">
+        <p14:creationId xmlns:p14="http://schemas.microsoft.com/office/powerpoint/2010/main" val="2859660975"/>
+      </p:ext>
+    </p:extLst>
+  </p:cSld>
+  <p:clrMapOvr>
+    <a:masterClrMapping/>
+  </p:clrMapOvr>
+</p:sld>
+</file>
+
+<file path=ppt/slides/slide11.xml><?xml version="1.0" encoding="utf-8"?>
+<p:sld xmlns:a="http://schemas.openxmlformats.org/drawingml/2006/main" xmlns:r="http://schemas.openxmlformats.org/officeDocument/2006/relationships" xmlns:p="http://schemas.openxmlformats.org/presentationml/2006/main">
+  <p:cSld>
+    <p:spTree>
+      <p:nvGrpSpPr>
+        <p:cNvPr id="1" name=""/>
+        <p:cNvGrpSpPr/>
+        <p:nvPr/>
+      </p:nvGrpSpPr>
+      <p:grpSpPr>
+        <a:xfrm>
+          <a:off x="0" y="0"/>
+          <a:ext cx="0" cy="0"/>
+          <a:chOff x="0" y="0"/>
+          <a:chExt cx="0" cy="0"/>
+        </a:xfrm>
+      </p:grpSpPr>
+      <p:sp>
+        <p:nvSpPr>
+          <p:cNvPr id="2" name="Titolo 1"/>
+          <p:cNvSpPr>
+            <a:spLocks noGrp="1"/>
+          </p:cNvSpPr>
+          <p:nvPr>
+            <p:ph type="title"/>
+          </p:nvPr>
+        </p:nvSpPr>
+        <p:spPr/>
+        <p:txBody>
+          <a:bodyPr/>
+          <a:lstStyle/>
+          <a:p>
+            <a:r>
+              <a:rPr lang="en-GB" dirty="0" smtClean="0"/>
+              <a:t>The crossover function</a:t>
+            </a:r>
+            <a:endParaRPr lang="en-GB" dirty="0"/>
+          </a:p>
+        </p:txBody>
+      </p:sp>
+      <p:sp>
+        <p:nvSpPr>
+          <p:cNvPr id="3" name="Segnaposto contenuto 2"/>
+          <p:cNvSpPr>
+            <a:spLocks noGrp="1"/>
+          </p:cNvSpPr>
+          <p:nvPr>
+            <p:ph sz="quarter" idx="1"/>
+          </p:nvPr>
+        </p:nvSpPr>
+        <p:spPr/>
+        <p:txBody>
+          <a:bodyPr/>
+          <a:lstStyle/>
+          <a:p>
+            <a:endParaRPr lang="en-GB"/>
+          </a:p>
+        </p:txBody>
+      </p:sp>
+    </p:spTree>
+    <p:extLst>
+      <p:ext uri="{BB962C8B-B14F-4D97-AF65-F5344CB8AC3E}">
+        <p14:creationId xmlns:p14="http://schemas.microsoft.com/office/powerpoint/2010/main" val="785710893"/>
+      </p:ext>
+    </p:extLst>
+  </p:cSld>
+  <p:clrMapOvr>
+    <a:masterClrMapping/>
+  </p:clrMapOvr>
+</p:sld>
+</file>
+
+<file path=ppt/slides/slide12.xml><?xml version="1.0" encoding="utf-8"?>
+<p:sld xmlns:a="http://schemas.openxmlformats.org/drawingml/2006/main" xmlns:r="http://schemas.openxmlformats.org/officeDocument/2006/relationships" xmlns:p="http://schemas.openxmlformats.org/presentationml/2006/main">
+  <p:cSld>
+    <p:spTree>
+      <p:nvGrpSpPr>
+        <p:cNvPr id="1" name=""/>
+        <p:cNvGrpSpPr/>
+        <p:nvPr/>
+      </p:nvGrpSpPr>
+      <p:grpSpPr>
+        <a:xfrm>
+          <a:off x="0" y="0"/>
+          <a:ext cx="0" cy="0"/>
+          <a:chOff x="0" y="0"/>
+          <a:chExt cx="0" cy="0"/>
+        </a:xfrm>
+      </p:grpSpPr>
+      <p:sp>
+        <p:nvSpPr>
+          <p:cNvPr id="2" name="Titolo 1"/>
+          <p:cNvSpPr>
+            <a:spLocks noGrp="1"/>
+          </p:cNvSpPr>
+          <p:nvPr>
+            <p:ph type="title"/>
+          </p:nvPr>
+        </p:nvSpPr>
+        <p:spPr/>
+        <p:txBody>
+          <a:bodyPr/>
+          <a:lstStyle/>
+          <a:p>
+            <a:r>
+              <a:rPr lang="en-GB" dirty="0" smtClean="0"/>
+              <a:t>The mutation function</a:t>
+            </a:r>
+            <a:endParaRPr lang="en-GB" dirty="0"/>
+          </a:p>
+        </p:txBody>
+      </p:sp>
+      <p:sp>
+        <p:nvSpPr>
+          <p:cNvPr id="3" name="Segnaposto contenuto 2"/>
+          <p:cNvSpPr>
+            <a:spLocks noGrp="1"/>
+          </p:cNvSpPr>
+          <p:nvPr>
+            <p:ph sz="quarter" idx="1"/>
+          </p:nvPr>
+        </p:nvSpPr>
+        <p:spPr/>
+        <p:txBody>
+          <a:bodyPr/>
+          <a:lstStyle/>
+          <a:p>
+            <a:endParaRPr lang="en-GB"/>
+          </a:p>
+        </p:txBody>
+      </p:sp>
+    </p:spTree>
+    <p:extLst>
+      <p:ext uri="{BB962C8B-B14F-4D97-AF65-F5344CB8AC3E}">
+        <p14:creationId xmlns:p14="http://schemas.microsoft.com/office/powerpoint/2010/main" val="1289497384"/>
+      </p:ext>
+    </p:extLst>
+  </p:cSld>
+  <p:clrMapOvr>
+    <a:masterClrMapping/>
+  </p:clrMapOvr>
+</p:sld>
+</file>
+
+<file path=ppt/slides/slide13.xml><?xml version="1.0" encoding="utf-8"?>
+<p:sld xmlns:a="http://schemas.openxmlformats.org/drawingml/2006/main" xmlns:r="http://schemas.openxmlformats.org/officeDocument/2006/relationships" xmlns:p="http://schemas.openxmlformats.org/presentationml/2006/main">
+  <p:cSld>
+    <p:spTree>
+      <p:nvGrpSpPr>
+        <p:cNvPr id="1" name=""/>
+        <p:cNvGrpSpPr/>
+        <p:nvPr/>
+      </p:nvGrpSpPr>
+      <p:grpSpPr>
+        <a:xfrm>
+          <a:off x="0" y="0"/>
+          <a:ext cx="0" cy="0"/>
+          <a:chOff x="0" y="0"/>
+          <a:chExt cx="0" cy="0"/>
+        </a:xfrm>
+      </p:grpSpPr>
+      <p:sp>
+        <p:nvSpPr>
+          <p:cNvPr id="2" name="Titolo 1"/>
+          <p:cNvSpPr>
+            <a:spLocks noGrp="1"/>
+          </p:cNvSpPr>
+          <p:nvPr>
+            <p:ph type="title"/>
+          </p:nvPr>
+        </p:nvSpPr>
+        <p:spPr/>
+        <p:txBody>
+          <a:bodyPr/>
+          <a:lstStyle/>
+          <a:p>
+            <a:r>
+              <a:rPr lang="en-GB" dirty="0" smtClean="0"/>
+              <a:t>Integration of the genetic algorithm with the </a:t>
+            </a:r>
+            <a:r>
+              <a:rPr lang="en-GB" dirty="0" err="1" smtClean="0"/>
+              <a:t>tabu</a:t>
+            </a:r>
+            <a:r>
+              <a:rPr lang="en-GB" dirty="0" smtClean="0"/>
+              <a:t> search</a:t>
+            </a:r>
+            <a:endParaRPr lang="en-GB" dirty="0"/>
+          </a:p>
+        </p:txBody>
+      </p:sp>
+      <p:sp>
+        <p:nvSpPr>
+          <p:cNvPr id="3" name="Segnaposto contenuto 2"/>
+          <p:cNvSpPr>
+            <a:spLocks noGrp="1"/>
+          </p:cNvSpPr>
+          <p:nvPr>
+            <p:ph sz="quarter" idx="1"/>
+          </p:nvPr>
+        </p:nvSpPr>
+        <p:spPr/>
+        <p:txBody>
+          <a:bodyPr/>
+          <a:lstStyle/>
+          <a:p>
+            <a:endParaRPr lang="en-GB"/>
+          </a:p>
+        </p:txBody>
+      </p:sp>
+    </p:spTree>
+    <p:extLst>
+      <p:ext uri="{BB962C8B-B14F-4D97-AF65-F5344CB8AC3E}">
+        <p14:creationId xmlns:p14="http://schemas.microsoft.com/office/powerpoint/2010/main" val="2332265691"/>
+      </p:ext>
+    </p:extLst>
+  </p:cSld>
+  <p:clrMapOvr>
+    <a:masterClrMapping/>
+  </p:clrMapOvr>
+</p:sld>
+</file>
+
+<file path=ppt/slides/slide14.xml><?xml version="1.0" encoding="utf-8"?>
+<p:sld xmlns:a="http://schemas.openxmlformats.org/drawingml/2006/main" xmlns:r="http://schemas.openxmlformats.org/officeDocument/2006/relationships" xmlns:p="http://schemas.openxmlformats.org/presentationml/2006/main">
+  <p:cSld>
+    <p:spTree>
+      <p:nvGrpSpPr>
+        <p:cNvPr id="1" name=""/>
+        <p:cNvGrpSpPr/>
+        <p:nvPr/>
+      </p:nvGrpSpPr>
+      <p:grpSpPr>
+        <a:xfrm>
+          <a:off x="0" y="0"/>
+          <a:ext cx="0" cy="0"/>
+          <a:chOff x="0" y="0"/>
+          <a:chExt cx="0" cy="0"/>
+        </a:xfrm>
+      </p:grpSpPr>
+      <p:sp>
+        <p:nvSpPr>
+          <p:cNvPr id="2" name="Titolo 1"/>
+          <p:cNvSpPr>
+            <a:spLocks noGrp="1"/>
+          </p:cNvSpPr>
+          <p:nvPr>
+            <p:ph type="title"/>
+          </p:nvPr>
+        </p:nvSpPr>
+        <p:spPr/>
+        <p:txBody>
+          <a:bodyPr/>
+          <a:lstStyle/>
+          <a:p>
+            <a:r>
+              <a:rPr lang="en-GB" dirty="0" smtClean="0"/>
+              <a:t>Our results</a:t>
+            </a:r>
+            <a:endParaRPr lang="en-GB" dirty="0"/>
+          </a:p>
+        </p:txBody>
+      </p:sp>
+      <p:sp>
+        <p:nvSpPr>
+          <p:cNvPr id="3" name="Segnaposto contenuto 2"/>
+          <p:cNvSpPr>
+            <a:spLocks noGrp="1"/>
+          </p:cNvSpPr>
+          <p:nvPr>
+            <p:ph sz="quarter" idx="1"/>
+          </p:nvPr>
+        </p:nvSpPr>
+        <p:spPr/>
+        <p:txBody>
+          <a:bodyPr/>
+          <a:lstStyle/>
+          <a:p>
+            <a:pPr marL="0" indent="0">
+              <a:buNone/>
+            </a:pPr>
+            <a:endParaRPr lang="en-GB" dirty="0" smtClean="0"/>
+          </a:p>
+          <a:p>
+            <a:pPr marL="0" indent="0">
+              <a:buNone/>
+            </a:pPr>
+            <a:endParaRPr lang="en-GB" dirty="0"/>
+          </a:p>
+          <a:p>
+            <a:pPr marL="0" indent="0">
+              <a:buNone/>
+            </a:pPr>
+            <a:endParaRPr lang="en-GB" dirty="0" smtClean="0"/>
+          </a:p>
+          <a:p>
+            <a:pPr marL="0" indent="0">
+              <a:buNone/>
+            </a:pPr>
+            <a:endParaRPr lang="en-GB" dirty="0"/>
+          </a:p>
+          <a:p>
+            <a:pPr marL="0" indent="0">
+              <a:buNone/>
+            </a:pPr>
+            <a:r>
+              <a:rPr lang="en-GB" dirty="0" smtClean="0"/>
+              <a:t>TODO qui </a:t>
+            </a:r>
+            <a:r>
+              <a:rPr lang="en-GB" dirty="0" err="1" smtClean="0"/>
+              <a:t>inseriamo</a:t>
+            </a:r>
+            <a:r>
+              <a:rPr lang="en-GB" dirty="0" smtClean="0"/>
+              <a:t> la </a:t>
+            </a:r>
+            <a:r>
+              <a:rPr lang="en-GB" dirty="0" err="1" smtClean="0"/>
+              <a:t>tabella</a:t>
+            </a:r>
+            <a:r>
+              <a:rPr lang="en-GB" dirty="0" smtClean="0"/>
+              <a:t> con I </a:t>
+            </a:r>
+            <a:r>
+              <a:rPr lang="en-GB" dirty="0" err="1" smtClean="0"/>
+              <a:t>risultati</a:t>
+            </a:r>
+            <a:endParaRPr lang="en-GB" dirty="0"/>
+          </a:p>
+        </p:txBody>
+      </p:sp>
+    </p:spTree>
+    <p:extLst>
+      <p:ext uri="{BB962C8B-B14F-4D97-AF65-F5344CB8AC3E}">
+        <p14:creationId xmlns:p14="http://schemas.microsoft.com/office/powerpoint/2010/main" val="4121732951"/>
+      </p:ext>
+    </p:extLst>
+  </p:cSld>
+  <p:clrMapOvr>
+    <a:masterClrMapping/>
+  </p:clrMapOvr>
+</p:sld>
+</file>
+
+<file path=ppt/slides/slide15.xml><?xml version="1.0" encoding="utf-8"?>
+<p:sld xmlns:a="http://schemas.openxmlformats.org/drawingml/2006/main" xmlns:r="http://schemas.openxmlformats.org/officeDocument/2006/relationships" xmlns:p="http://schemas.openxmlformats.org/presentationml/2006/main">
+  <p:cSld>
+    <p:spTree>
+      <p:nvGrpSpPr>
+        <p:cNvPr id="1" name=""/>
+        <p:cNvGrpSpPr/>
+        <p:nvPr/>
+      </p:nvGrpSpPr>
+      <p:grpSpPr>
+        <a:xfrm>
+          <a:off x="0" y="0"/>
+          <a:ext cx="0" cy="0"/>
+          <a:chOff x="0" y="0"/>
+          <a:chExt cx="0" cy="0"/>
+        </a:xfrm>
+      </p:grpSpPr>
+      <p:sp>
+        <p:nvSpPr>
+          <p:cNvPr id="2" name="Titolo 1"/>
+          <p:cNvSpPr>
+            <a:spLocks noGrp="1"/>
+          </p:cNvSpPr>
+          <p:nvPr>
+            <p:ph type="title"/>
+          </p:nvPr>
+        </p:nvSpPr>
+        <p:spPr/>
+        <p:txBody>
+          <a:bodyPr/>
+          <a:lstStyle/>
+          <a:p>
+            <a:r>
+              <a:rPr lang="en-GB" smtClean="0"/>
+              <a:t>Final considerations</a:t>
+            </a:r>
+            <a:endParaRPr lang="en-GB"/>
+          </a:p>
+        </p:txBody>
+      </p:sp>
+      <p:sp>
+        <p:nvSpPr>
+          <p:cNvPr id="3" name="Segnaposto contenuto 2"/>
+          <p:cNvSpPr>
+            <a:spLocks noGrp="1"/>
+          </p:cNvSpPr>
+          <p:nvPr>
+            <p:ph sz="quarter" idx="1"/>
+          </p:nvPr>
+        </p:nvSpPr>
+        <p:spPr/>
+        <p:txBody>
+          <a:bodyPr/>
+          <a:lstStyle/>
+          <a:p>
+            <a:endParaRPr lang="en-GB"/>
+          </a:p>
+        </p:txBody>
+      </p:sp>
+    </p:spTree>
+    <p:extLst>
+      <p:ext uri="{BB962C8B-B14F-4D97-AF65-F5344CB8AC3E}">
+        <p14:creationId xmlns:p14="http://schemas.microsoft.com/office/powerpoint/2010/main" val="4225332565"/>
+      </p:ext>
+    </p:extLst>
+  </p:cSld>
+  <p:clrMapOvr>
+    <a:masterClrMapping/>
+  </p:clrMapOvr>
+</p:sld>
+</file>
+
 <file path=ppt/slides/slide2.xml><?xml version="1.0" encoding="utf-8"?>
 <p:sld xmlns:a="http://schemas.openxmlformats.org/drawingml/2006/main" xmlns:r="http://schemas.openxmlformats.org/officeDocument/2006/relationships" xmlns:p="http://schemas.openxmlformats.org/presentationml/2006/main">
   <p:cSld>
@@ -14159,7 +14830,6 @@
               <a:rPr lang="it-IT" dirty="0" smtClean="0"/>
               <a:t>.</a:t>
             </a:r>
-            <a:endParaRPr lang="it-IT" dirty="0" smtClean="0"/>
           </a:p>
           <a:p>
             <a:endParaRPr lang="it-IT" dirty="0"/>
@@ -14626,6 +15296,103 @@
       </p:par>
     </p:tnLst>
   </p:timing>
+</p:sld>
+</file>
+
+<file path=ppt/slides/slide9.xml><?xml version="1.0" encoding="utf-8"?>
+<p:sld xmlns:a="http://schemas.openxmlformats.org/drawingml/2006/main" xmlns:r="http://schemas.openxmlformats.org/officeDocument/2006/relationships" xmlns:p="http://schemas.openxmlformats.org/presentationml/2006/main">
+  <p:cSld>
+    <p:spTree>
+      <p:nvGrpSpPr>
+        <p:cNvPr id="1" name=""/>
+        <p:cNvGrpSpPr/>
+        <p:nvPr/>
+      </p:nvGrpSpPr>
+      <p:grpSpPr>
+        <a:xfrm>
+          <a:off x="0" y="0"/>
+          <a:ext cx="0" cy="0"/>
+          <a:chOff x="0" y="0"/>
+          <a:chExt cx="0" cy="0"/>
+        </a:xfrm>
+      </p:grpSpPr>
+      <p:sp>
+        <p:nvSpPr>
+          <p:cNvPr id="2" name="Titolo 1"/>
+          <p:cNvSpPr>
+            <a:spLocks noGrp="1"/>
+          </p:cNvSpPr>
+          <p:nvPr>
+            <p:ph type="title"/>
+          </p:nvPr>
+        </p:nvSpPr>
+        <p:spPr/>
+        <p:txBody>
+          <a:bodyPr/>
+          <a:lstStyle/>
+          <a:p>
+            <a:r>
+              <a:rPr lang="en-GB" dirty="0" smtClean="0"/>
+              <a:t>The chromosome model</a:t>
+            </a:r>
+            <a:endParaRPr lang="en-GB" dirty="0"/>
+          </a:p>
+        </p:txBody>
+      </p:sp>
+      <p:sp>
+        <p:nvSpPr>
+          <p:cNvPr id="3" name="Segnaposto contenuto 2"/>
+          <p:cNvSpPr>
+            <a:spLocks noGrp="1"/>
+          </p:cNvSpPr>
+          <p:nvPr>
+            <p:ph sz="quarter" idx="1"/>
+          </p:nvPr>
+        </p:nvSpPr>
+        <p:spPr/>
+        <p:txBody>
+          <a:bodyPr/>
+          <a:lstStyle/>
+          <a:p>
+            <a:pPr marL="0" indent="0">
+              <a:buNone/>
+            </a:pPr>
+            <a:r>
+              <a:rPr lang="en-GB" dirty="0" smtClean="0"/>
+              <a:t>We decided to model the chromosomes for the genetic algorithm as sequences of numbers of length equal to the number of customers plus the number of vehicles - 1.</a:t>
+            </a:r>
+          </a:p>
+          <a:p>
+            <a:pPr marL="0" indent="0">
+              <a:buNone/>
+            </a:pPr>
+            <a:r>
+              <a:rPr lang="en-GB" dirty="0" smtClean="0"/>
+              <a:t>The number that identifies a customer is the customer’s id.</a:t>
+            </a:r>
+          </a:p>
+          <a:p>
+            <a:pPr marL="0" indent="0">
+              <a:buNone/>
+            </a:pPr>
+            <a:r>
+              <a:rPr lang="en-GB" dirty="0" smtClean="0"/>
+              <a:t>The customers are assigned to the first vehicle that precedes them in the chromosome. A vehicle followed by another vehicle represents an empty route.</a:t>
+            </a:r>
+            <a:endParaRPr lang="en-GB" dirty="0"/>
+          </a:p>
+        </p:txBody>
+      </p:sp>
+    </p:spTree>
+    <p:extLst>
+      <p:ext uri="{BB962C8B-B14F-4D97-AF65-F5344CB8AC3E}">
+        <p14:creationId xmlns:p14="http://schemas.microsoft.com/office/powerpoint/2010/main" val="2002208753"/>
+      </p:ext>
+    </p:extLst>
+  </p:cSld>
+  <p:clrMapOvr>
+    <a:masterClrMapping/>
+  </p:clrMapOvr>
 </p:sld>
 </file>
 

</xml_diff>

<commit_message>
Altre modifiche alla presentazione
</commit_message>
<xml_diff>
--- a/Documenti/OMA ASSIGNMENT 2014.pptx
+++ b/Documenti/OMA ASSIGNMENT 2014.pptx
@@ -888,6 +888,753 @@
 </file>
 
 <file path=ppt/diagrams/colors2.xml><?xml version="1.0" encoding="utf-8"?>
+<dgm:colorsDef xmlns:dgm="http://schemas.openxmlformats.org/drawingml/2006/diagram" xmlns:a="http://schemas.openxmlformats.org/drawingml/2006/main" uniqueId="urn:microsoft.com/office/officeart/2005/8/colors/accent1_2">
+  <dgm:title val=""/>
+  <dgm:desc val=""/>
+  <dgm:catLst>
+    <dgm:cat type="accent1" pri="11200"/>
+  </dgm:catLst>
+  <dgm:styleLbl name="node0">
+    <dgm:fillClrLst meth="repeat">
+      <a:schemeClr val="accent1"/>
+    </dgm:fillClrLst>
+    <dgm:linClrLst meth="repeat">
+      <a:schemeClr val="lt1"/>
+    </dgm:linClrLst>
+    <dgm:effectClrLst/>
+    <dgm:txLinClrLst/>
+    <dgm:txFillClrLst/>
+    <dgm:txEffectClrLst/>
+  </dgm:styleLbl>
+  <dgm:styleLbl name="alignNode1">
+    <dgm:fillClrLst meth="repeat">
+      <a:schemeClr val="accent1"/>
+    </dgm:fillClrLst>
+    <dgm:linClrLst meth="repeat">
+      <a:schemeClr val="accent1"/>
+    </dgm:linClrLst>
+    <dgm:effectClrLst/>
+    <dgm:txLinClrLst/>
+    <dgm:txFillClrLst/>
+    <dgm:txEffectClrLst/>
+  </dgm:styleLbl>
+  <dgm:styleLbl name="node1">
+    <dgm:fillClrLst meth="repeat">
+      <a:schemeClr val="accent1"/>
+    </dgm:fillClrLst>
+    <dgm:linClrLst meth="repeat">
+      <a:schemeClr val="lt1"/>
+    </dgm:linClrLst>
+    <dgm:effectClrLst/>
+    <dgm:txLinClrLst/>
+    <dgm:txFillClrLst/>
+    <dgm:txEffectClrLst/>
+  </dgm:styleLbl>
+  <dgm:styleLbl name="lnNode1">
+    <dgm:fillClrLst meth="repeat">
+      <a:schemeClr val="accent1"/>
+    </dgm:fillClrLst>
+    <dgm:linClrLst meth="repeat">
+      <a:schemeClr val="lt1"/>
+    </dgm:linClrLst>
+    <dgm:effectClrLst/>
+    <dgm:txLinClrLst/>
+    <dgm:txFillClrLst/>
+    <dgm:txEffectClrLst/>
+  </dgm:styleLbl>
+  <dgm:styleLbl name="vennNode1">
+    <dgm:fillClrLst meth="repeat">
+      <a:schemeClr val="accent1">
+        <a:alpha val="50000"/>
+      </a:schemeClr>
+    </dgm:fillClrLst>
+    <dgm:linClrLst meth="repeat">
+      <a:schemeClr val="lt1"/>
+    </dgm:linClrLst>
+    <dgm:effectClrLst/>
+    <dgm:txLinClrLst/>
+    <dgm:txFillClrLst/>
+    <dgm:txEffectClrLst/>
+  </dgm:styleLbl>
+  <dgm:styleLbl name="node2">
+    <dgm:fillClrLst meth="repeat">
+      <a:schemeClr val="accent1"/>
+    </dgm:fillClrLst>
+    <dgm:linClrLst meth="repeat">
+      <a:schemeClr val="lt1"/>
+    </dgm:linClrLst>
+    <dgm:effectClrLst/>
+    <dgm:txLinClrLst/>
+    <dgm:txFillClrLst/>
+    <dgm:txEffectClrLst/>
+  </dgm:styleLbl>
+  <dgm:styleLbl name="node3">
+    <dgm:fillClrLst meth="repeat">
+      <a:schemeClr val="accent1"/>
+    </dgm:fillClrLst>
+    <dgm:linClrLst meth="repeat">
+      <a:schemeClr val="lt1"/>
+    </dgm:linClrLst>
+    <dgm:effectClrLst/>
+    <dgm:txLinClrLst/>
+    <dgm:txFillClrLst/>
+    <dgm:txEffectClrLst/>
+  </dgm:styleLbl>
+  <dgm:styleLbl name="node4">
+    <dgm:fillClrLst meth="repeat">
+      <a:schemeClr val="accent1"/>
+    </dgm:fillClrLst>
+    <dgm:linClrLst meth="repeat">
+      <a:schemeClr val="lt1"/>
+    </dgm:linClrLst>
+    <dgm:effectClrLst/>
+    <dgm:txLinClrLst/>
+    <dgm:txFillClrLst/>
+    <dgm:txEffectClrLst/>
+  </dgm:styleLbl>
+  <dgm:styleLbl name="fgImgPlace1">
+    <dgm:fillClrLst meth="repeat">
+      <a:schemeClr val="accent1">
+        <a:tint val="50000"/>
+      </a:schemeClr>
+    </dgm:fillClrLst>
+    <dgm:linClrLst meth="repeat">
+      <a:schemeClr val="lt1"/>
+    </dgm:linClrLst>
+    <dgm:effectClrLst/>
+    <dgm:txLinClrLst/>
+    <dgm:txFillClrLst meth="repeat">
+      <a:schemeClr val="lt1"/>
+    </dgm:txFillClrLst>
+    <dgm:txEffectClrLst/>
+  </dgm:styleLbl>
+  <dgm:styleLbl name="alignImgPlace1">
+    <dgm:fillClrLst meth="repeat">
+      <a:schemeClr val="accent1">
+        <a:tint val="50000"/>
+      </a:schemeClr>
+    </dgm:fillClrLst>
+    <dgm:linClrLst meth="repeat">
+      <a:schemeClr val="lt1"/>
+    </dgm:linClrLst>
+    <dgm:effectClrLst/>
+    <dgm:txLinClrLst/>
+    <dgm:txFillClrLst meth="repeat">
+      <a:schemeClr val="lt1"/>
+    </dgm:txFillClrLst>
+    <dgm:txEffectClrLst/>
+  </dgm:styleLbl>
+  <dgm:styleLbl name="bgImgPlace1">
+    <dgm:fillClrLst meth="repeat">
+      <a:schemeClr val="accent1">
+        <a:tint val="50000"/>
+      </a:schemeClr>
+    </dgm:fillClrLst>
+    <dgm:linClrLst meth="repeat">
+      <a:schemeClr val="lt1"/>
+    </dgm:linClrLst>
+    <dgm:effectClrLst/>
+    <dgm:txLinClrLst/>
+    <dgm:txFillClrLst meth="repeat">
+      <a:schemeClr val="lt1"/>
+    </dgm:txFillClrLst>
+    <dgm:txEffectClrLst/>
+  </dgm:styleLbl>
+  <dgm:styleLbl name="sibTrans2D1">
+    <dgm:fillClrLst meth="repeat">
+      <a:schemeClr val="accent1">
+        <a:tint val="60000"/>
+      </a:schemeClr>
+    </dgm:fillClrLst>
+    <dgm:linClrLst meth="repeat">
+      <a:schemeClr val="accent1">
+        <a:tint val="60000"/>
+      </a:schemeClr>
+    </dgm:linClrLst>
+    <dgm:effectClrLst/>
+    <dgm:txLinClrLst/>
+    <dgm:txFillClrLst/>
+    <dgm:txEffectClrLst/>
+  </dgm:styleLbl>
+  <dgm:styleLbl name="fgSibTrans2D1">
+    <dgm:fillClrLst meth="repeat">
+      <a:schemeClr val="accent1">
+        <a:tint val="60000"/>
+      </a:schemeClr>
+    </dgm:fillClrLst>
+    <dgm:linClrLst meth="repeat">
+      <a:schemeClr val="accent1">
+        <a:tint val="60000"/>
+      </a:schemeClr>
+    </dgm:linClrLst>
+    <dgm:effectClrLst/>
+    <dgm:txLinClrLst/>
+    <dgm:txFillClrLst/>
+    <dgm:txEffectClrLst/>
+  </dgm:styleLbl>
+  <dgm:styleLbl name="bgSibTrans2D1">
+    <dgm:fillClrLst meth="repeat">
+      <a:schemeClr val="accent1">
+        <a:tint val="60000"/>
+      </a:schemeClr>
+    </dgm:fillClrLst>
+    <dgm:linClrLst meth="repeat">
+      <a:schemeClr val="accent1">
+        <a:tint val="60000"/>
+      </a:schemeClr>
+    </dgm:linClrLst>
+    <dgm:effectClrLst/>
+    <dgm:txLinClrLst/>
+    <dgm:txFillClrLst/>
+    <dgm:txEffectClrLst/>
+  </dgm:styleLbl>
+  <dgm:styleLbl name="sibTrans1D1">
+    <dgm:fillClrLst meth="repeat">
+      <a:schemeClr val="accent1"/>
+    </dgm:fillClrLst>
+    <dgm:linClrLst meth="repeat">
+      <a:schemeClr val="accent1"/>
+    </dgm:linClrLst>
+    <dgm:effectClrLst/>
+    <dgm:txLinClrLst/>
+    <dgm:txFillClrLst meth="repeat">
+      <a:schemeClr val="tx1"/>
+    </dgm:txFillClrLst>
+    <dgm:txEffectClrLst/>
+  </dgm:styleLbl>
+  <dgm:styleLbl name="callout">
+    <dgm:fillClrLst meth="repeat">
+      <a:schemeClr val="accent1"/>
+    </dgm:fillClrLst>
+    <dgm:linClrLst meth="repeat">
+      <a:schemeClr val="accent1">
+        <a:tint val="50000"/>
+      </a:schemeClr>
+    </dgm:linClrLst>
+    <dgm:effectClrLst/>
+    <dgm:txLinClrLst/>
+    <dgm:txFillClrLst meth="repeat">
+      <a:schemeClr val="tx1"/>
+    </dgm:txFillClrLst>
+    <dgm:txEffectClrLst/>
+  </dgm:styleLbl>
+  <dgm:styleLbl name="asst0">
+    <dgm:fillClrLst meth="repeat">
+      <a:schemeClr val="accent1"/>
+    </dgm:fillClrLst>
+    <dgm:linClrLst meth="repeat">
+      <a:schemeClr val="lt1"/>
+    </dgm:linClrLst>
+    <dgm:effectClrLst/>
+    <dgm:txLinClrLst/>
+    <dgm:txFillClrLst/>
+    <dgm:txEffectClrLst/>
+  </dgm:styleLbl>
+  <dgm:styleLbl name="asst1">
+    <dgm:fillClrLst meth="repeat">
+      <a:schemeClr val="accent1"/>
+    </dgm:fillClrLst>
+    <dgm:linClrLst meth="repeat">
+      <a:schemeClr val="lt1"/>
+    </dgm:linClrLst>
+    <dgm:effectClrLst/>
+    <dgm:txLinClrLst/>
+    <dgm:txFillClrLst/>
+    <dgm:txEffectClrLst/>
+  </dgm:styleLbl>
+  <dgm:styleLbl name="asst2">
+    <dgm:fillClrLst meth="repeat">
+      <a:schemeClr val="accent1"/>
+    </dgm:fillClrLst>
+    <dgm:linClrLst meth="repeat">
+      <a:schemeClr val="lt1"/>
+    </dgm:linClrLst>
+    <dgm:effectClrLst/>
+    <dgm:txLinClrLst/>
+    <dgm:txFillClrLst/>
+    <dgm:txEffectClrLst/>
+  </dgm:styleLbl>
+  <dgm:styleLbl name="asst3">
+    <dgm:fillClrLst meth="repeat">
+      <a:schemeClr val="accent1"/>
+    </dgm:fillClrLst>
+    <dgm:linClrLst meth="repeat">
+      <a:schemeClr val="lt1"/>
+    </dgm:linClrLst>
+    <dgm:effectClrLst/>
+    <dgm:txLinClrLst/>
+    <dgm:txFillClrLst/>
+    <dgm:txEffectClrLst/>
+  </dgm:styleLbl>
+  <dgm:styleLbl name="asst4">
+    <dgm:fillClrLst meth="repeat">
+      <a:schemeClr val="accent1"/>
+    </dgm:fillClrLst>
+    <dgm:linClrLst meth="repeat">
+      <a:schemeClr val="lt1"/>
+    </dgm:linClrLst>
+    <dgm:effectClrLst/>
+    <dgm:txLinClrLst/>
+    <dgm:txFillClrLst/>
+    <dgm:txEffectClrLst/>
+  </dgm:styleLbl>
+  <dgm:styleLbl name="parChTrans2D1">
+    <dgm:fillClrLst meth="repeat">
+      <a:schemeClr val="accent1">
+        <a:tint val="60000"/>
+      </a:schemeClr>
+    </dgm:fillClrLst>
+    <dgm:linClrLst meth="repeat">
+      <a:schemeClr val="accent1">
+        <a:tint val="60000"/>
+      </a:schemeClr>
+    </dgm:linClrLst>
+    <dgm:effectClrLst/>
+    <dgm:txLinClrLst/>
+    <dgm:txFillClrLst meth="repeat">
+      <a:schemeClr val="lt1"/>
+    </dgm:txFillClrLst>
+    <dgm:txEffectClrLst/>
+  </dgm:styleLbl>
+  <dgm:styleLbl name="parChTrans2D2">
+    <dgm:fillClrLst meth="repeat">
+      <a:schemeClr val="accent1"/>
+    </dgm:fillClrLst>
+    <dgm:linClrLst meth="repeat">
+      <a:schemeClr val="accent1"/>
+    </dgm:linClrLst>
+    <dgm:effectClrLst/>
+    <dgm:txLinClrLst/>
+    <dgm:txFillClrLst meth="repeat">
+      <a:schemeClr val="lt1"/>
+    </dgm:txFillClrLst>
+    <dgm:txEffectClrLst/>
+  </dgm:styleLbl>
+  <dgm:styleLbl name="parChTrans2D3">
+    <dgm:fillClrLst meth="repeat">
+      <a:schemeClr val="accent1"/>
+    </dgm:fillClrLst>
+    <dgm:linClrLst meth="repeat">
+      <a:schemeClr val="accent1"/>
+    </dgm:linClrLst>
+    <dgm:effectClrLst/>
+    <dgm:txLinClrLst/>
+    <dgm:txFillClrLst meth="repeat">
+      <a:schemeClr val="lt1"/>
+    </dgm:txFillClrLst>
+    <dgm:txEffectClrLst/>
+  </dgm:styleLbl>
+  <dgm:styleLbl name="parChTrans2D4">
+    <dgm:fillClrLst meth="repeat">
+      <a:schemeClr val="accent1"/>
+    </dgm:fillClrLst>
+    <dgm:linClrLst meth="repeat">
+      <a:schemeClr val="accent1"/>
+    </dgm:linClrLst>
+    <dgm:effectClrLst/>
+    <dgm:txLinClrLst/>
+    <dgm:txFillClrLst meth="repeat">
+      <a:schemeClr val="lt1"/>
+    </dgm:txFillClrLst>
+    <dgm:txEffectClrLst/>
+  </dgm:styleLbl>
+  <dgm:styleLbl name="parChTrans1D1">
+    <dgm:fillClrLst meth="repeat">
+      <a:schemeClr val="accent1"/>
+    </dgm:fillClrLst>
+    <dgm:linClrLst meth="repeat">
+      <a:schemeClr val="accent1">
+        <a:shade val="60000"/>
+      </a:schemeClr>
+    </dgm:linClrLst>
+    <dgm:effectClrLst/>
+    <dgm:txLinClrLst/>
+    <dgm:txFillClrLst meth="repeat">
+      <a:schemeClr val="tx1"/>
+    </dgm:txFillClrLst>
+    <dgm:txEffectClrLst/>
+  </dgm:styleLbl>
+  <dgm:styleLbl name="parChTrans1D2">
+    <dgm:fillClrLst meth="repeat">
+      <a:schemeClr val="accent1"/>
+    </dgm:fillClrLst>
+    <dgm:linClrLst meth="repeat">
+      <a:schemeClr val="accent1">
+        <a:shade val="60000"/>
+      </a:schemeClr>
+    </dgm:linClrLst>
+    <dgm:effectClrLst/>
+    <dgm:txLinClrLst/>
+    <dgm:txFillClrLst meth="repeat">
+      <a:schemeClr val="tx1"/>
+    </dgm:txFillClrLst>
+    <dgm:txEffectClrLst/>
+  </dgm:styleLbl>
+  <dgm:styleLbl name="parChTrans1D3">
+    <dgm:fillClrLst meth="repeat">
+      <a:schemeClr val="accent1"/>
+    </dgm:fillClrLst>
+    <dgm:linClrLst meth="repeat">
+      <a:schemeClr val="accent1">
+        <a:shade val="80000"/>
+      </a:schemeClr>
+    </dgm:linClrLst>
+    <dgm:effectClrLst/>
+    <dgm:txLinClrLst/>
+    <dgm:txFillClrLst meth="repeat">
+      <a:schemeClr val="tx1"/>
+    </dgm:txFillClrLst>
+    <dgm:txEffectClrLst/>
+  </dgm:styleLbl>
+  <dgm:styleLbl name="parChTrans1D4">
+    <dgm:fillClrLst meth="repeat">
+      <a:schemeClr val="accent1"/>
+    </dgm:fillClrLst>
+    <dgm:linClrLst meth="repeat">
+      <a:schemeClr val="accent1">
+        <a:shade val="80000"/>
+      </a:schemeClr>
+    </dgm:linClrLst>
+    <dgm:effectClrLst/>
+    <dgm:txLinClrLst/>
+    <dgm:txFillClrLst meth="repeat">
+      <a:schemeClr val="tx1"/>
+    </dgm:txFillClrLst>
+    <dgm:txEffectClrLst/>
+  </dgm:styleLbl>
+  <dgm:styleLbl name="fgAcc1">
+    <dgm:fillClrLst meth="repeat">
+      <a:schemeClr val="lt1">
+        <a:alpha val="90000"/>
+      </a:schemeClr>
+    </dgm:fillClrLst>
+    <dgm:linClrLst meth="repeat">
+      <a:schemeClr val="accent1"/>
+    </dgm:linClrLst>
+    <dgm:effectClrLst/>
+    <dgm:txLinClrLst/>
+    <dgm:txFillClrLst meth="repeat">
+      <a:schemeClr val="dk1"/>
+    </dgm:txFillClrLst>
+    <dgm:txEffectClrLst/>
+  </dgm:styleLbl>
+  <dgm:styleLbl name="conFgAcc1">
+    <dgm:fillClrLst meth="repeat">
+      <a:schemeClr val="lt1">
+        <a:alpha val="90000"/>
+      </a:schemeClr>
+    </dgm:fillClrLst>
+    <dgm:linClrLst meth="repeat">
+      <a:schemeClr val="accent1"/>
+    </dgm:linClrLst>
+    <dgm:effectClrLst/>
+    <dgm:txLinClrLst/>
+    <dgm:txFillClrLst meth="repeat">
+      <a:schemeClr val="dk1"/>
+    </dgm:txFillClrLst>
+    <dgm:txEffectClrLst/>
+  </dgm:styleLbl>
+  <dgm:styleLbl name="alignAcc1">
+    <dgm:fillClrLst meth="repeat">
+      <a:schemeClr val="lt1">
+        <a:alpha val="90000"/>
+      </a:schemeClr>
+    </dgm:fillClrLst>
+    <dgm:linClrLst meth="repeat">
+      <a:schemeClr val="accent1"/>
+    </dgm:linClrLst>
+    <dgm:effectClrLst/>
+    <dgm:txLinClrLst/>
+    <dgm:txFillClrLst meth="repeat">
+      <a:schemeClr val="dk1"/>
+    </dgm:txFillClrLst>
+    <dgm:txEffectClrLst/>
+  </dgm:styleLbl>
+  <dgm:styleLbl name="trAlignAcc1">
+    <dgm:fillClrLst meth="repeat">
+      <a:schemeClr val="lt1">
+        <a:alpha val="40000"/>
+      </a:schemeClr>
+    </dgm:fillClrLst>
+    <dgm:linClrLst meth="repeat">
+      <a:schemeClr val="accent1"/>
+    </dgm:linClrLst>
+    <dgm:effectClrLst/>
+    <dgm:txLinClrLst/>
+    <dgm:txFillClrLst meth="repeat">
+      <a:schemeClr val="dk1"/>
+    </dgm:txFillClrLst>
+    <dgm:txEffectClrLst/>
+  </dgm:styleLbl>
+  <dgm:styleLbl name="bgAcc1">
+    <dgm:fillClrLst meth="repeat">
+      <a:schemeClr val="lt1">
+        <a:alpha val="90000"/>
+      </a:schemeClr>
+    </dgm:fillClrLst>
+    <dgm:linClrLst meth="repeat">
+      <a:schemeClr val="accent1"/>
+    </dgm:linClrLst>
+    <dgm:effectClrLst/>
+    <dgm:txLinClrLst/>
+    <dgm:txFillClrLst meth="repeat">
+      <a:schemeClr val="dk1"/>
+    </dgm:txFillClrLst>
+    <dgm:txEffectClrLst/>
+  </dgm:styleLbl>
+  <dgm:styleLbl name="solidFgAcc1">
+    <dgm:fillClrLst meth="repeat">
+      <a:schemeClr val="lt1"/>
+    </dgm:fillClrLst>
+    <dgm:linClrLst meth="repeat">
+      <a:schemeClr val="accent1"/>
+    </dgm:linClrLst>
+    <dgm:effectClrLst/>
+    <dgm:txLinClrLst/>
+    <dgm:txFillClrLst meth="repeat">
+      <a:schemeClr val="dk1"/>
+    </dgm:txFillClrLst>
+    <dgm:txEffectClrLst/>
+  </dgm:styleLbl>
+  <dgm:styleLbl name="solidAlignAcc1">
+    <dgm:fillClrLst meth="repeat">
+      <a:schemeClr val="lt1"/>
+    </dgm:fillClrLst>
+    <dgm:linClrLst meth="repeat">
+      <a:schemeClr val="accent1"/>
+    </dgm:linClrLst>
+    <dgm:effectClrLst/>
+    <dgm:txLinClrLst/>
+    <dgm:txFillClrLst meth="repeat">
+      <a:schemeClr val="dk1"/>
+    </dgm:txFillClrLst>
+    <dgm:txEffectClrLst/>
+  </dgm:styleLbl>
+  <dgm:styleLbl name="solidBgAcc1">
+    <dgm:fillClrLst meth="repeat">
+      <a:schemeClr val="lt1"/>
+    </dgm:fillClrLst>
+    <dgm:linClrLst meth="repeat">
+      <a:schemeClr val="accent1"/>
+    </dgm:linClrLst>
+    <dgm:effectClrLst/>
+    <dgm:txLinClrLst/>
+    <dgm:txFillClrLst meth="repeat">
+      <a:schemeClr val="dk1"/>
+    </dgm:txFillClrLst>
+    <dgm:txEffectClrLst/>
+  </dgm:styleLbl>
+  <dgm:styleLbl name="fgAccFollowNode1">
+    <dgm:fillClrLst meth="repeat">
+      <a:schemeClr val="accent1">
+        <a:alpha val="90000"/>
+        <a:tint val="40000"/>
+      </a:schemeClr>
+    </dgm:fillClrLst>
+    <dgm:linClrLst meth="repeat">
+      <a:schemeClr val="accent1">
+        <a:alpha val="90000"/>
+        <a:tint val="40000"/>
+      </a:schemeClr>
+    </dgm:linClrLst>
+    <dgm:effectClrLst/>
+    <dgm:txLinClrLst/>
+    <dgm:txFillClrLst meth="repeat">
+      <a:schemeClr val="dk1"/>
+    </dgm:txFillClrLst>
+    <dgm:txEffectClrLst/>
+  </dgm:styleLbl>
+  <dgm:styleLbl name="alignAccFollowNode1">
+    <dgm:fillClrLst meth="repeat">
+      <a:schemeClr val="accent1">
+        <a:alpha val="90000"/>
+        <a:tint val="40000"/>
+      </a:schemeClr>
+    </dgm:fillClrLst>
+    <dgm:linClrLst meth="repeat">
+      <a:schemeClr val="accent1">
+        <a:alpha val="90000"/>
+        <a:tint val="40000"/>
+      </a:schemeClr>
+    </dgm:linClrLst>
+    <dgm:effectClrLst/>
+    <dgm:txLinClrLst/>
+    <dgm:txFillClrLst meth="repeat">
+      <a:schemeClr val="dk1"/>
+    </dgm:txFillClrLst>
+    <dgm:txEffectClrLst/>
+  </dgm:styleLbl>
+  <dgm:styleLbl name="bgAccFollowNode1">
+    <dgm:fillClrLst meth="repeat">
+      <a:schemeClr val="accent1">
+        <a:alpha val="90000"/>
+        <a:tint val="40000"/>
+      </a:schemeClr>
+    </dgm:fillClrLst>
+    <dgm:linClrLst meth="repeat">
+      <a:schemeClr val="accent1">
+        <a:alpha val="90000"/>
+        <a:tint val="40000"/>
+      </a:schemeClr>
+    </dgm:linClrLst>
+    <dgm:effectClrLst/>
+    <dgm:txLinClrLst/>
+    <dgm:txFillClrLst meth="repeat">
+      <a:schemeClr val="dk1"/>
+    </dgm:txFillClrLst>
+    <dgm:txEffectClrLst/>
+  </dgm:styleLbl>
+  <dgm:styleLbl name="fgAcc0">
+    <dgm:fillClrLst meth="repeat">
+      <a:schemeClr val="lt1">
+        <a:alpha val="90000"/>
+      </a:schemeClr>
+    </dgm:fillClrLst>
+    <dgm:linClrLst meth="repeat">
+      <a:schemeClr val="accent1"/>
+    </dgm:linClrLst>
+    <dgm:effectClrLst/>
+    <dgm:txLinClrLst/>
+    <dgm:txFillClrLst meth="repeat">
+      <a:schemeClr val="dk1"/>
+    </dgm:txFillClrLst>
+    <dgm:txEffectClrLst/>
+  </dgm:styleLbl>
+  <dgm:styleLbl name="fgAcc2">
+    <dgm:fillClrLst meth="repeat">
+      <a:schemeClr val="lt1">
+        <a:alpha val="90000"/>
+      </a:schemeClr>
+    </dgm:fillClrLst>
+    <dgm:linClrLst meth="repeat">
+      <a:schemeClr val="accent1"/>
+    </dgm:linClrLst>
+    <dgm:effectClrLst/>
+    <dgm:txLinClrLst/>
+    <dgm:txFillClrLst meth="repeat">
+      <a:schemeClr val="dk1"/>
+    </dgm:txFillClrLst>
+    <dgm:txEffectClrLst/>
+  </dgm:styleLbl>
+  <dgm:styleLbl name="fgAcc3">
+    <dgm:fillClrLst meth="repeat">
+      <a:schemeClr val="lt1">
+        <a:alpha val="90000"/>
+      </a:schemeClr>
+    </dgm:fillClrLst>
+    <dgm:linClrLst meth="repeat">
+      <a:schemeClr val="accent1"/>
+    </dgm:linClrLst>
+    <dgm:effectClrLst/>
+    <dgm:txLinClrLst/>
+    <dgm:txFillClrLst meth="repeat">
+      <a:schemeClr val="dk1"/>
+    </dgm:txFillClrLst>
+    <dgm:txEffectClrLst/>
+  </dgm:styleLbl>
+  <dgm:styleLbl name="fgAcc4">
+    <dgm:fillClrLst meth="repeat">
+      <a:schemeClr val="lt1">
+        <a:alpha val="90000"/>
+      </a:schemeClr>
+    </dgm:fillClrLst>
+    <dgm:linClrLst meth="repeat">
+      <a:schemeClr val="accent1"/>
+    </dgm:linClrLst>
+    <dgm:effectClrLst/>
+    <dgm:txLinClrLst/>
+    <dgm:txFillClrLst meth="repeat">
+      <a:schemeClr val="dk1"/>
+    </dgm:txFillClrLst>
+    <dgm:txEffectClrLst/>
+  </dgm:styleLbl>
+  <dgm:styleLbl name="bgShp">
+    <dgm:fillClrLst meth="repeat">
+      <a:schemeClr val="accent1">
+        <a:tint val="40000"/>
+      </a:schemeClr>
+    </dgm:fillClrLst>
+    <dgm:linClrLst meth="repeat">
+      <a:schemeClr val="accent1"/>
+    </dgm:linClrLst>
+    <dgm:effectClrLst/>
+    <dgm:txLinClrLst/>
+    <dgm:txFillClrLst meth="repeat">
+      <a:schemeClr val="dk1"/>
+    </dgm:txFillClrLst>
+    <dgm:txEffectClrLst/>
+  </dgm:styleLbl>
+  <dgm:styleLbl name="dkBgShp">
+    <dgm:fillClrLst meth="repeat">
+      <a:schemeClr val="accent1">
+        <a:shade val="80000"/>
+      </a:schemeClr>
+    </dgm:fillClrLst>
+    <dgm:linClrLst meth="repeat">
+      <a:schemeClr val="accent1"/>
+    </dgm:linClrLst>
+    <dgm:effectClrLst/>
+    <dgm:txLinClrLst/>
+    <dgm:txFillClrLst meth="repeat">
+      <a:schemeClr val="lt1"/>
+    </dgm:txFillClrLst>
+    <dgm:txEffectClrLst/>
+  </dgm:styleLbl>
+  <dgm:styleLbl name="trBgShp">
+    <dgm:fillClrLst meth="repeat">
+      <a:schemeClr val="accent1">
+        <a:tint val="50000"/>
+        <a:alpha val="40000"/>
+      </a:schemeClr>
+    </dgm:fillClrLst>
+    <dgm:linClrLst meth="repeat">
+      <a:schemeClr val="accent1"/>
+    </dgm:linClrLst>
+    <dgm:effectClrLst/>
+    <dgm:txLinClrLst/>
+    <dgm:txFillClrLst meth="repeat">
+      <a:schemeClr val="lt1"/>
+    </dgm:txFillClrLst>
+    <dgm:txEffectClrLst/>
+  </dgm:styleLbl>
+  <dgm:styleLbl name="fgShp">
+    <dgm:fillClrLst meth="repeat">
+      <a:schemeClr val="accent1">
+        <a:tint val="60000"/>
+      </a:schemeClr>
+    </dgm:fillClrLst>
+    <dgm:linClrLst meth="repeat">
+      <a:schemeClr val="lt1"/>
+    </dgm:linClrLst>
+    <dgm:effectClrLst/>
+    <dgm:txLinClrLst/>
+    <dgm:txFillClrLst meth="repeat">
+      <a:schemeClr val="dk1"/>
+    </dgm:txFillClrLst>
+    <dgm:txEffectClrLst/>
+  </dgm:styleLbl>
+  <dgm:styleLbl name="revTx">
+    <dgm:fillClrLst meth="repeat">
+      <a:schemeClr val="lt1">
+        <a:alpha val="0"/>
+      </a:schemeClr>
+    </dgm:fillClrLst>
+    <dgm:linClrLst meth="repeat">
+      <a:schemeClr val="dk1">
+        <a:alpha val="0"/>
+      </a:schemeClr>
+    </dgm:linClrLst>
+    <dgm:effectClrLst/>
+    <dgm:txLinClrLst/>
+    <dgm:txFillClrLst meth="repeat">
+      <a:schemeClr val="tx1"/>
+    </dgm:txFillClrLst>
+    <dgm:txEffectClrLst/>
+  </dgm:styleLbl>
+</dgm:colorsDef>
+</file>
+
+<file path=ppt/diagrams/colors3.xml><?xml version="1.0" encoding="utf-8"?>
 <dgm:colorsDef xmlns:dgm="http://schemas.openxmlformats.org/drawingml/2006/diagram" xmlns:a="http://schemas.openxmlformats.org/drawingml/2006/main" uniqueId="urn:microsoft.com/office/officeart/2005/8/colors/accent1_2">
   <dgm:title val=""/>
   <dgm:desc val=""/>
@@ -2552,6 +3299,215 @@
   <dgm:extLst>
     <a:ext uri="http://schemas.microsoft.com/office/drawing/2008/diagram">
       <dsp:dataModelExt xmlns:dsp="http://schemas.microsoft.com/office/drawing/2008/diagram" relId="rId7" minVer="http://schemas.openxmlformats.org/drawingml/2006/diagram"/>
+    </a:ext>
+  </dgm:extLst>
+</dgm:dataModel>
+</file>
+
+<file path=ppt/diagrams/data3.xml><?xml version="1.0" encoding="utf-8"?>
+<dgm:dataModel xmlns:dgm="http://schemas.openxmlformats.org/drawingml/2006/diagram" xmlns:a="http://schemas.openxmlformats.org/drawingml/2006/main">
+  <dgm:ptLst>
+    <dgm:pt modelId="{91B8A679-1D94-424F-81EE-3A23C646A2C1}" type="doc">
+      <dgm:prSet loTypeId="urn:microsoft.com/office/officeart/2005/8/layout/process1" loCatId="process" qsTypeId="urn:microsoft.com/office/officeart/2005/8/quickstyle/simple1" qsCatId="simple" csTypeId="urn:microsoft.com/office/officeart/2005/8/colors/accent1_2" csCatId="accent1" phldr="1"/>
+      <dgm:spPr/>
+    </dgm:pt>
+    <dgm:pt modelId="{B227A944-FAFC-43E3-895A-64009C39AB38}">
+      <dgm:prSet phldrT="[Testo]"/>
+      <dgm:spPr/>
+      <dgm:t>
+        <a:bodyPr/>
+        <a:lstStyle/>
+        <a:p>
+          <a:r>
+            <a:rPr lang="en-GB" dirty="0" smtClean="0"/>
+            <a:t>Genetic algorithm</a:t>
+          </a:r>
+          <a:endParaRPr lang="en-GB" dirty="0"/>
+        </a:p>
+      </dgm:t>
+    </dgm:pt>
+    <dgm:pt modelId="{D2A03957-C040-4AE0-8ABE-31F8E7943E98}" type="parTrans" cxnId="{1F8FFC36-4954-4D05-84FA-2FE4BF3FA232}">
+      <dgm:prSet/>
+      <dgm:spPr/>
+      <dgm:t>
+        <a:bodyPr/>
+        <a:lstStyle/>
+        <a:p>
+          <a:endParaRPr lang="en-GB"/>
+        </a:p>
+      </dgm:t>
+    </dgm:pt>
+    <dgm:pt modelId="{8DCDA1E6-DD2F-47D2-8C4C-A97252FCE908}" type="sibTrans" cxnId="{1F8FFC36-4954-4D05-84FA-2FE4BF3FA232}">
+      <dgm:prSet/>
+      <dgm:spPr/>
+      <dgm:t>
+        <a:bodyPr/>
+        <a:lstStyle/>
+        <a:p>
+          <a:endParaRPr lang="en-GB"/>
+        </a:p>
+      </dgm:t>
+    </dgm:pt>
+    <dgm:pt modelId="{7D73E623-82F4-4F30-BE74-DD840ED8E902}">
+      <dgm:prSet phldrT="[Testo]"/>
+      <dgm:spPr/>
+      <dgm:t>
+        <a:bodyPr/>
+        <a:lstStyle/>
+        <a:p>
+          <a:r>
+            <a:rPr lang="en-GB" dirty="0" smtClean="0"/>
+            <a:t>Solution conversion</a:t>
+          </a:r>
+          <a:endParaRPr lang="en-GB" dirty="0"/>
+        </a:p>
+      </dgm:t>
+    </dgm:pt>
+    <dgm:pt modelId="{AE585E60-03E7-4CA2-BC39-C6F339F5F749}" type="parTrans" cxnId="{F0F41D07-95C1-4DCF-9027-8C3CC8F5F902}">
+      <dgm:prSet/>
+      <dgm:spPr/>
+      <dgm:t>
+        <a:bodyPr/>
+        <a:lstStyle/>
+        <a:p>
+          <a:endParaRPr lang="en-GB"/>
+        </a:p>
+      </dgm:t>
+    </dgm:pt>
+    <dgm:pt modelId="{F27A028B-CF43-4250-B703-CD39430C4098}" type="sibTrans" cxnId="{F0F41D07-95C1-4DCF-9027-8C3CC8F5F902}">
+      <dgm:prSet/>
+      <dgm:spPr/>
+      <dgm:t>
+        <a:bodyPr/>
+        <a:lstStyle/>
+        <a:p>
+          <a:endParaRPr lang="en-GB"/>
+        </a:p>
+      </dgm:t>
+    </dgm:pt>
+    <dgm:pt modelId="{7A7E1AE3-3ABC-4C66-B75D-640446D0F977}">
+      <dgm:prSet phldrT="[Testo]"/>
+      <dgm:spPr/>
+      <dgm:t>
+        <a:bodyPr/>
+        <a:lstStyle/>
+        <a:p>
+          <a:r>
+            <a:rPr lang="en-GB" dirty="0" err="1" smtClean="0"/>
+            <a:t>Tabu</a:t>
+          </a:r>
+          <a:r>
+            <a:rPr lang="en-GB" dirty="0" smtClean="0"/>
+            <a:t> Search</a:t>
+          </a:r>
+          <a:endParaRPr lang="en-GB" dirty="0"/>
+        </a:p>
+      </dgm:t>
+    </dgm:pt>
+    <dgm:pt modelId="{999EA1E9-9AA9-42A5-B3DE-CEDF306BE8E5}" type="parTrans" cxnId="{8B235863-F4B8-4973-ABAE-FCFEA5FE845F}">
+      <dgm:prSet/>
+      <dgm:spPr/>
+      <dgm:t>
+        <a:bodyPr/>
+        <a:lstStyle/>
+        <a:p>
+          <a:endParaRPr lang="en-GB"/>
+        </a:p>
+      </dgm:t>
+    </dgm:pt>
+    <dgm:pt modelId="{5E6509DD-B751-4EF2-9F25-C288D6877607}" type="sibTrans" cxnId="{8B235863-F4B8-4973-ABAE-FCFEA5FE845F}">
+      <dgm:prSet/>
+      <dgm:spPr/>
+      <dgm:t>
+        <a:bodyPr/>
+        <a:lstStyle/>
+        <a:p>
+          <a:endParaRPr lang="en-GB"/>
+        </a:p>
+      </dgm:t>
+    </dgm:pt>
+    <dgm:pt modelId="{6C5763D8-5E34-4D0A-95E3-1B68BF2ED282}" type="pres">
+      <dgm:prSet presAssocID="{91B8A679-1D94-424F-81EE-3A23C646A2C1}" presName="Name0" presStyleCnt="0">
+        <dgm:presLayoutVars>
+          <dgm:dir/>
+          <dgm:resizeHandles val="exact"/>
+        </dgm:presLayoutVars>
+      </dgm:prSet>
+      <dgm:spPr/>
+    </dgm:pt>
+    <dgm:pt modelId="{313F98D7-5C72-48E7-83C7-B1678599F232}" type="pres">
+      <dgm:prSet presAssocID="{B227A944-FAFC-43E3-895A-64009C39AB38}" presName="node" presStyleLbl="node1" presStyleIdx="0" presStyleCnt="3">
+        <dgm:presLayoutVars>
+          <dgm:bulletEnabled val="1"/>
+        </dgm:presLayoutVars>
+      </dgm:prSet>
+      <dgm:spPr/>
+    </dgm:pt>
+    <dgm:pt modelId="{642710ED-7D02-4D47-B8C8-3664D7FD45B5}" type="pres">
+      <dgm:prSet presAssocID="{8DCDA1E6-DD2F-47D2-8C4C-A97252FCE908}" presName="sibTrans" presStyleLbl="sibTrans2D1" presStyleIdx="0" presStyleCnt="2"/>
+      <dgm:spPr/>
+    </dgm:pt>
+    <dgm:pt modelId="{794645C6-04D8-4116-8A1D-81973D8AD792}" type="pres">
+      <dgm:prSet presAssocID="{8DCDA1E6-DD2F-47D2-8C4C-A97252FCE908}" presName="connectorText" presStyleLbl="sibTrans2D1" presStyleIdx="0" presStyleCnt="2"/>
+      <dgm:spPr/>
+    </dgm:pt>
+    <dgm:pt modelId="{A86D75A4-0862-4AED-AAED-B10829E562A8}" type="pres">
+      <dgm:prSet presAssocID="{7D73E623-82F4-4F30-BE74-DD840ED8E902}" presName="node" presStyleLbl="node1" presStyleIdx="1" presStyleCnt="3">
+        <dgm:presLayoutVars>
+          <dgm:bulletEnabled val="1"/>
+        </dgm:presLayoutVars>
+      </dgm:prSet>
+      <dgm:spPr/>
+    </dgm:pt>
+    <dgm:pt modelId="{E74D95E6-EF35-43D1-919D-28F3121EDF7D}" type="pres">
+      <dgm:prSet presAssocID="{F27A028B-CF43-4250-B703-CD39430C4098}" presName="sibTrans" presStyleLbl="sibTrans2D1" presStyleIdx="1" presStyleCnt="2"/>
+      <dgm:spPr/>
+    </dgm:pt>
+    <dgm:pt modelId="{BEDDD561-6A3C-48C0-822A-55DCBBD9B976}" type="pres">
+      <dgm:prSet presAssocID="{F27A028B-CF43-4250-B703-CD39430C4098}" presName="connectorText" presStyleLbl="sibTrans2D1" presStyleIdx="1" presStyleCnt="2"/>
+      <dgm:spPr/>
+    </dgm:pt>
+    <dgm:pt modelId="{40608270-2028-4523-A2F6-AECCC3EAF433}" type="pres">
+      <dgm:prSet presAssocID="{7A7E1AE3-3ABC-4C66-B75D-640446D0F977}" presName="node" presStyleLbl="node1" presStyleIdx="2" presStyleCnt="3">
+        <dgm:presLayoutVars>
+          <dgm:bulletEnabled val="1"/>
+        </dgm:presLayoutVars>
+      </dgm:prSet>
+      <dgm:spPr/>
+      <dgm:t>
+        <a:bodyPr/>
+        <a:lstStyle/>
+        <a:p>
+          <a:endParaRPr lang="en-GB"/>
+        </a:p>
+      </dgm:t>
+    </dgm:pt>
+  </dgm:ptLst>
+  <dgm:cxnLst>
+    <dgm:cxn modelId="{1F8FFC36-4954-4D05-84FA-2FE4BF3FA232}" srcId="{91B8A679-1D94-424F-81EE-3A23C646A2C1}" destId="{B227A944-FAFC-43E3-895A-64009C39AB38}" srcOrd="0" destOrd="0" parTransId="{D2A03957-C040-4AE0-8ABE-31F8E7943E98}" sibTransId="{8DCDA1E6-DD2F-47D2-8C4C-A97252FCE908}"/>
+    <dgm:cxn modelId="{F0F41D07-95C1-4DCF-9027-8C3CC8F5F902}" srcId="{91B8A679-1D94-424F-81EE-3A23C646A2C1}" destId="{7D73E623-82F4-4F30-BE74-DD840ED8E902}" srcOrd="1" destOrd="0" parTransId="{AE585E60-03E7-4CA2-BC39-C6F339F5F749}" sibTransId="{F27A028B-CF43-4250-B703-CD39430C4098}"/>
+    <dgm:cxn modelId="{7E833CA3-7302-4B85-8F7B-9E89A73B999B}" type="presOf" srcId="{91B8A679-1D94-424F-81EE-3A23C646A2C1}" destId="{6C5763D8-5E34-4D0A-95E3-1B68BF2ED282}" srcOrd="0" destOrd="0" presId="urn:microsoft.com/office/officeart/2005/8/layout/process1"/>
+    <dgm:cxn modelId="{87D5D7A1-990C-4703-B85F-77C42B86C5C6}" type="presOf" srcId="{8DCDA1E6-DD2F-47D2-8C4C-A97252FCE908}" destId="{642710ED-7D02-4D47-B8C8-3664D7FD45B5}" srcOrd="0" destOrd="0" presId="urn:microsoft.com/office/officeart/2005/8/layout/process1"/>
+    <dgm:cxn modelId="{8B235863-F4B8-4973-ABAE-FCFEA5FE845F}" srcId="{91B8A679-1D94-424F-81EE-3A23C646A2C1}" destId="{7A7E1AE3-3ABC-4C66-B75D-640446D0F977}" srcOrd="2" destOrd="0" parTransId="{999EA1E9-9AA9-42A5-B3DE-CEDF306BE8E5}" sibTransId="{5E6509DD-B751-4EF2-9F25-C288D6877607}"/>
+    <dgm:cxn modelId="{A59240E1-3DDD-4F88-BD3A-72A7567191C4}" type="presOf" srcId="{8DCDA1E6-DD2F-47D2-8C4C-A97252FCE908}" destId="{794645C6-04D8-4116-8A1D-81973D8AD792}" srcOrd="1" destOrd="0" presId="urn:microsoft.com/office/officeart/2005/8/layout/process1"/>
+    <dgm:cxn modelId="{C7E90BD8-083D-4EE1-8939-35806DC9D5F8}" type="presOf" srcId="{F27A028B-CF43-4250-B703-CD39430C4098}" destId="{E74D95E6-EF35-43D1-919D-28F3121EDF7D}" srcOrd="0" destOrd="0" presId="urn:microsoft.com/office/officeart/2005/8/layout/process1"/>
+    <dgm:cxn modelId="{10D1C499-92FE-4C27-8E4F-7F1CA4F404B4}" type="presOf" srcId="{7A7E1AE3-3ABC-4C66-B75D-640446D0F977}" destId="{40608270-2028-4523-A2F6-AECCC3EAF433}" srcOrd="0" destOrd="0" presId="urn:microsoft.com/office/officeart/2005/8/layout/process1"/>
+    <dgm:cxn modelId="{8050663E-9925-423A-8047-8B0D245CAE77}" type="presOf" srcId="{B227A944-FAFC-43E3-895A-64009C39AB38}" destId="{313F98D7-5C72-48E7-83C7-B1678599F232}" srcOrd="0" destOrd="0" presId="urn:microsoft.com/office/officeart/2005/8/layout/process1"/>
+    <dgm:cxn modelId="{722FD011-823B-45B5-9671-09EA2E3A1BE5}" type="presOf" srcId="{7D73E623-82F4-4F30-BE74-DD840ED8E902}" destId="{A86D75A4-0862-4AED-AAED-B10829E562A8}" srcOrd="0" destOrd="0" presId="urn:microsoft.com/office/officeart/2005/8/layout/process1"/>
+    <dgm:cxn modelId="{6AFF6716-5325-4175-9179-9DAE7BA44532}" type="presOf" srcId="{F27A028B-CF43-4250-B703-CD39430C4098}" destId="{BEDDD561-6A3C-48C0-822A-55DCBBD9B976}" srcOrd="1" destOrd="0" presId="urn:microsoft.com/office/officeart/2005/8/layout/process1"/>
+    <dgm:cxn modelId="{05FC1516-E6D7-4FCD-A5C7-2EBE4663F9B3}" type="presParOf" srcId="{6C5763D8-5E34-4D0A-95E3-1B68BF2ED282}" destId="{313F98D7-5C72-48E7-83C7-B1678599F232}" srcOrd="0" destOrd="0" presId="urn:microsoft.com/office/officeart/2005/8/layout/process1"/>
+    <dgm:cxn modelId="{EBCFD107-6290-439B-9BAB-3BA786450DA6}" type="presParOf" srcId="{6C5763D8-5E34-4D0A-95E3-1B68BF2ED282}" destId="{642710ED-7D02-4D47-B8C8-3664D7FD45B5}" srcOrd="1" destOrd="0" presId="urn:microsoft.com/office/officeart/2005/8/layout/process1"/>
+    <dgm:cxn modelId="{5CE08CB0-8843-44B0-8BA5-E77825391ABD}" type="presParOf" srcId="{642710ED-7D02-4D47-B8C8-3664D7FD45B5}" destId="{794645C6-04D8-4116-8A1D-81973D8AD792}" srcOrd="0" destOrd="0" presId="urn:microsoft.com/office/officeart/2005/8/layout/process1"/>
+    <dgm:cxn modelId="{DCBAAB16-A3F6-4780-B3C1-2888FA498309}" type="presParOf" srcId="{6C5763D8-5E34-4D0A-95E3-1B68BF2ED282}" destId="{A86D75A4-0862-4AED-AAED-B10829E562A8}" srcOrd="2" destOrd="0" presId="urn:microsoft.com/office/officeart/2005/8/layout/process1"/>
+    <dgm:cxn modelId="{25DA079C-311A-4A85-913E-F9A42B7B4D80}" type="presParOf" srcId="{6C5763D8-5E34-4D0A-95E3-1B68BF2ED282}" destId="{E74D95E6-EF35-43D1-919D-28F3121EDF7D}" srcOrd="3" destOrd="0" presId="urn:microsoft.com/office/officeart/2005/8/layout/process1"/>
+    <dgm:cxn modelId="{D7B6C2DA-D0A2-429F-96C8-B0A7B47161BD}" type="presParOf" srcId="{E74D95E6-EF35-43D1-919D-28F3121EDF7D}" destId="{BEDDD561-6A3C-48C0-822A-55DCBBD9B976}" srcOrd="0" destOrd="0" presId="urn:microsoft.com/office/officeart/2005/8/layout/process1"/>
+    <dgm:cxn modelId="{B8469E0C-EA08-4C47-86FA-61A514B9CED7}" type="presParOf" srcId="{6C5763D8-5E34-4D0A-95E3-1B68BF2ED282}" destId="{40608270-2028-4523-A2F6-AECCC3EAF433}" srcOrd="4" destOrd="0" presId="urn:microsoft.com/office/officeart/2005/8/layout/process1"/>
+  </dgm:cxnLst>
+  <dgm:bg/>
+  <dgm:whole/>
+  <dgm:extLst>
+    <a:ext uri="http://schemas.microsoft.com/office/drawing/2008/diagram">
+      <dsp:dataModelExt xmlns:dsp="http://schemas.microsoft.com/office/drawing/2008/diagram" relId="rId6" minVer="http://schemas.openxmlformats.org/drawingml/2006/diagram"/>
     </a:ext>
   </dgm:extLst>
 </dgm:dataModel>
@@ -3826,6 +4782,397 @@
       <dsp:txXfrm>
         <a:off x="6596296" y="3633287"/>
         <a:ext cx="313618" cy="429086"/>
+      </dsp:txXfrm>
+    </dsp:sp>
+  </dsp:spTree>
+</dsp:drawing>
+</file>
+
+<file path=ppt/diagrams/drawing3.xml><?xml version="1.0" encoding="utf-8"?>
+<dsp:drawing xmlns:dgm="http://schemas.openxmlformats.org/drawingml/2006/diagram" xmlns:dsp="http://schemas.microsoft.com/office/drawing/2008/diagram" xmlns:a="http://schemas.openxmlformats.org/drawingml/2006/main">
+  <dsp:spTree>
+    <dsp:nvGrpSpPr>
+      <dsp:cNvPr id="0" name=""/>
+      <dsp:cNvGrpSpPr/>
+    </dsp:nvGrpSpPr>
+    <dsp:grpSpPr/>
+    <dsp:sp modelId="{313F98D7-5C72-48E7-83C7-B1678599F232}">
+      <dsp:nvSpPr>
+        <dsp:cNvPr id="0" name=""/>
+        <dsp:cNvSpPr/>
+      </dsp:nvSpPr>
+      <dsp:spPr>
+        <a:xfrm>
+          <a:off x="5357" y="1551582"/>
+          <a:ext cx="1601390" cy="960834"/>
+        </a:xfrm>
+        <a:prstGeom prst="roundRect">
+          <a:avLst>
+            <a:gd name="adj" fmla="val 10000"/>
+          </a:avLst>
+        </a:prstGeom>
+        <a:solidFill>
+          <a:schemeClr val="accent1">
+            <a:hueOff val="0"/>
+            <a:satOff val="0"/>
+            <a:lumOff val="0"/>
+            <a:alphaOff val="0"/>
+          </a:schemeClr>
+        </a:solidFill>
+        <a:ln w="25400" cap="flat" cmpd="sng" algn="ctr">
+          <a:solidFill>
+            <a:schemeClr val="lt1">
+              <a:hueOff val="0"/>
+              <a:satOff val="0"/>
+              <a:lumOff val="0"/>
+              <a:alphaOff val="0"/>
+            </a:schemeClr>
+          </a:solidFill>
+          <a:prstDash val="solid"/>
+        </a:ln>
+        <a:effectLst/>
+      </dsp:spPr>
+      <dsp:style>
+        <a:lnRef idx="2">
+          <a:scrgbClr r="0" g="0" b="0"/>
+        </a:lnRef>
+        <a:fillRef idx="1">
+          <a:scrgbClr r="0" g="0" b="0"/>
+        </a:fillRef>
+        <a:effectRef idx="0">
+          <a:scrgbClr r="0" g="0" b="0"/>
+        </a:effectRef>
+        <a:fontRef idx="minor">
+          <a:schemeClr val="lt1"/>
+        </a:fontRef>
+      </dsp:style>
+      <dsp:txBody>
+        <a:bodyPr spcFirstLastPara="0" vert="horz" wrap="square" lIns="83820" tIns="83820" rIns="83820" bIns="83820" numCol="1" spcCol="1270" anchor="ctr" anchorCtr="0">
+          <a:noAutofit/>
+        </a:bodyPr>
+        <a:lstStyle/>
+        <a:p>
+          <a:pPr lvl="0" algn="ctr" defTabSz="977900">
+            <a:lnSpc>
+              <a:spcPct val="90000"/>
+            </a:lnSpc>
+            <a:spcBef>
+              <a:spcPct val="0"/>
+            </a:spcBef>
+            <a:spcAft>
+              <a:spcPct val="35000"/>
+            </a:spcAft>
+          </a:pPr>
+          <a:r>
+            <a:rPr lang="en-GB" sz="2200" kern="1200" dirty="0" smtClean="0"/>
+            <a:t>Genetic algorithm</a:t>
+          </a:r>
+          <a:endParaRPr lang="en-GB" sz="2200" kern="1200" dirty="0"/>
+        </a:p>
+      </dsp:txBody>
+      <dsp:txXfrm>
+        <a:off x="33499" y="1579724"/>
+        <a:ext cx="1545106" cy="904550"/>
+      </dsp:txXfrm>
+    </dsp:sp>
+    <dsp:sp modelId="{642710ED-7D02-4D47-B8C8-3664D7FD45B5}">
+      <dsp:nvSpPr>
+        <dsp:cNvPr id="0" name=""/>
+        <dsp:cNvSpPr/>
+      </dsp:nvSpPr>
+      <dsp:spPr>
+        <a:xfrm>
+          <a:off x="1766887" y="1833427"/>
+          <a:ext cx="339494" cy="397144"/>
+        </a:xfrm>
+        <a:prstGeom prst="rightArrow">
+          <a:avLst>
+            <a:gd name="adj1" fmla="val 60000"/>
+            <a:gd name="adj2" fmla="val 50000"/>
+          </a:avLst>
+        </a:prstGeom>
+        <a:solidFill>
+          <a:schemeClr val="accent1">
+            <a:tint val="60000"/>
+            <a:hueOff val="0"/>
+            <a:satOff val="0"/>
+            <a:lumOff val="0"/>
+            <a:alphaOff val="0"/>
+          </a:schemeClr>
+        </a:solidFill>
+        <a:ln>
+          <a:noFill/>
+        </a:ln>
+        <a:effectLst/>
+      </dsp:spPr>
+      <dsp:style>
+        <a:lnRef idx="0">
+          <a:scrgbClr r="0" g="0" b="0"/>
+        </a:lnRef>
+        <a:fillRef idx="1">
+          <a:scrgbClr r="0" g="0" b="0"/>
+        </a:fillRef>
+        <a:effectRef idx="0">
+          <a:scrgbClr r="0" g="0" b="0"/>
+        </a:effectRef>
+        <a:fontRef idx="minor">
+          <a:schemeClr val="lt1"/>
+        </a:fontRef>
+      </dsp:style>
+      <dsp:txBody>
+        <a:bodyPr spcFirstLastPara="0" vert="horz" wrap="square" lIns="0" tIns="0" rIns="0" bIns="0" numCol="1" spcCol="1270" anchor="ctr" anchorCtr="0">
+          <a:noAutofit/>
+        </a:bodyPr>
+        <a:lstStyle/>
+        <a:p>
+          <a:pPr lvl="0" algn="ctr" defTabSz="755650">
+            <a:lnSpc>
+              <a:spcPct val="90000"/>
+            </a:lnSpc>
+            <a:spcBef>
+              <a:spcPct val="0"/>
+            </a:spcBef>
+            <a:spcAft>
+              <a:spcPct val="35000"/>
+            </a:spcAft>
+          </a:pPr>
+          <a:endParaRPr lang="en-GB" sz="1700" kern="1200"/>
+        </a:p>
+      </dsp:txBody>
+      <dsp:txXfrm>
+        <a:off x="1766887" y="1912856"/>
+        <a:ext cx="237646" cy="238286"/>
+      </dsp:txXfrm>
+    </dsp:sp>
+    <dsp:sp modelId="{A86D75A4-0862-4AED-AAED-B10829E562A8}">
+      <dsp:nvSpPr>
+        <dsp:cNvPr id="0" name=""/>
+        <dsp:cNvSpPr/>
+      </dsp:nvSpPr>
+      <dsp:spPr>
+        <a:xfrm>
+          <a:off x="2247304" y="1551582"/>
+          <a:ext cx="1601390" cy="960834"/>
+        </a:xfrm>
+        <a:prstGeom prst="roundRect">
+          <a:avLst>
+            <a:gd name="adj" fmla="val 10000"/>
+          </a:avLst>
+        </a:prstGeom>
+        <a:solidFill>
+          <a:schemeClr val="accent1">
+            <a:hueOff val="0"/>
+            <a:satOff val="0"/>
+            <a:lumOff val="0"/>
+            <a:alphaOff val="0"/>
+          </a:schemeClr>
+        </a:solidFill>
+        <a:ln w="25400" cap="flat" cmpd="sng" algn="ctr">
+          <a:solidFill>
+            <a:schemeClr val="lt1">
+              <a:hueOff val="0"/>
+              <a:satOff val="0"/>
+              <a:lumOff val="0"/>
+              <a:alphaOff val="0"/>
+            </a:schemeClr>
+          </a:solidFill>
+          <a:prstDash val="solid"/>
+        </a:ln>
+        <a:effectLst/>
+      </dsp:spPr>
+      <dsp:style>
+        <a:lnRef idx="2">
+          <a:scrgbClr r="0" g="0" b="0"/>
+        </a:lnRef>
+        <a:fillRef idx="1">
+          <a:scrgbClr r="0" g="0" b="0"/>
+        </a:fillRef>
+        <a:effectRef idx="0">
+          <a:scrgbClr r="0" g="0" b="0"/>
+        </a:effectRef>
+        <a:fontRef idx="minor">
+          <a:schemeClr val="lt1"/>
+        </a:fontRef>
+      </dsp:style>
+      <dsp:txBody>
+        <a:bodyPr spcFirstLastPara="0" vert="horz" wrap="square" lIns="83820" tIns="83820" rIns="83820" bIns="83820" numCol="1" spcCol="1270" anchor="ctr" anchorCtr="0">
+          <a:noAutofit/>
+        </a:bodyPr>
+        <a:lstStyle/>
+        <a:p>
+          <a:pPr lvl="0" algn="ctr" defTabSz="977900">
+            <a:lnSpc>
+              <a:spcPct val="90000"/>
+            </a:lnSpc>
+            <a:spcBef>
+              <a:spcPct val="0"/>
+            </a:spcBef>
+            <a:spcAft>
+              <a:spcPct val="35000"/>
+            </a:spcAft>
+          </a:pPr>
+          <a:r>
+            <a:rPr lang="en-GB" sz="2200" kern="1200" dirty="0" smtClean="0"/>
+            <a:t>Solution conversion</a:t>
+          </a:r>
+          <a:endParaRPr lang="en-GB" sz="2200" kern="1200" dirty="0"/>
+        </a:p>
+      </dsp:txBody>
+      <dsp:txXfrm>
+        <a:off x="2275446" y="1579724"/>
+        <a:ext cx="1545106" cy="904550"/>
+      </dsp:txXfrm>
+    </dsp:sp>
+    <dsp:sp modelId="{E74D95E6-EF35-43D1-919D-28F3121EDF7D}">
+      <dsp:nvSpPr>
+        <dsp:cNvPr id="0" name=""/>
+        <dsp:cNvSpPr/>
+      </dsp:nvSpPr>
+      <dsp:spPr>
+        <a:xfrm>
+          <a:off x="4008834" y="1833427"/>
+          <a:ext cx="339494" cy="397144"/>
+        </a:xfrm>
+        <a:prstGeom prst="rightArrow">
+          <a:avLst>
+            <a:gd name="adj1" fmla="val 60000"/>
+            <a:gd name="adj2" fmla="val 50000"/>
+          </a:avLst>
+        </a:prstGeom>
+        <a:solidFill>
+          <a:schemeClr val="accent1">
+            <a:tint val="60000"/>
+            <a:hueOff val="0"/>
+            <a:satOff val="0"/>
+            <a:lumOff val="0"/>
+            <a:alphaOff val="0"/>
+          </a:schemeClr>
+        </a:solidFill>
+        <a:ln>
+          <a:noFill/>
+        </a:ln>
+        <a:effectLst/>
+      </dsp:spPr>
+      <dsp:style>
+        <a:lnRef idx="0">
+          <a:scrgbClr r="0" g="0" b="0"/>
+        </a:lnRef>
+        <a:fillRef idx="1">
+          <a:scrgbClr r="0" g="0" b="0"/>
+        </a:fillRef>
+        <a:effectRef idx="0">
+          <a:scrgbClr r="0" g="0" b="0"/>
+        </a:effectRef>
+        <a:fontRef idx="minor">
+          <a:schemeClr val="lt1"/>
+        </a:fontRef>
+      </dsp:style>
+      <dsp:txBody>
+        <a:bodyPr spcFirstLastPara="0" vert="horz" wrap="square" lIns="0" tIns="0" rIns="0" bIns="0" numCol="1" spcCol="1270" anchor="ctr" anchorCtr="0">
+          <a:noAutofit/>
+        </a:bodyPr>
+        <a:lstStyle/>
+        <a:p>
+          <a:pPr lvl="0" algn="ctr" defTabSz="755650">
+            <a:lnSpc>
+              <a:spcPct val="90000"/>
+            </a:lnSpc>
+            <a:spcBef>
+              <a:spcPct val="0"/>
+            </a:spcBef>
+            <a:spcAft>
+              <a:spcPct val="35000"/>
+            </a:spcAft>
+          </a:pPr>
+          <a:endParaRPr lang="en-GB" sz="1700" kern="1200"/>
+        </a:p>
+      </dsp:txBody>
+      <dsp:txXfrm>
+        <a:off x="4008834" y="1912856"/>
+        <a:ext cx="237646" cy="238286"/>
+      </dsp:txXfrm>
+    </dsp:sp>
+    <dsp:sp modelId="{40608270-2028-4523-A2F6-AECCC3EAF433}">
+      <dsp:nvSpPr>
+        <dsp:cNvPr id="0" name=""/>
+        <dsp:cNvSpPr/>
+      </dsp:nvSpPr>
+      <dsp:spPr>
+        <a:xfrm>
+          <a:off x="4489251" y="1551582"/>
+          <a:ext cx="1601390" cy="960834"/>
+        </a:xfrm>
+        <a:prstGeom prst="roundRect">
+          <a:avLst>
+            <a:gd name="adj" fmla="val 10000"/>
+          </a:avLst>
+        </a:prstGeom>
+        <a:solidFill>
+          <a:schemeClr val="accent1">
+            <a:hueOff val="0"/>
+            <a:satOff val="0"/>
+            <a:lumOff val="0"/>
+            <a:alphaOff val="0"/>
+          </a:schemeClr>
+        </a:solidFill>
+        <a:ln w="25400" cap="flat" cmpd="sng" algn="ctr">
+          <a:solidFill>
+            <a:schemeClr val="lt1">
+              <a:hueOff val="0"/>
+              <a:satOff val="0"/>
+              <a:lumOff val="0"/>
+              <a:alphaOff val="0"/>
+            </a:schemeClr>
+          </a:solidFill>
+          <a:prstDash val="solid"/>
+        </a:ln>
+        <a:effectLst/>
+      </dsp:spPr>
+      <dsp:style>
+        <a:lnRef idx="2">
+          <a:scrgbClr r="0" g="0" b="0"/>
+        </a:lnRef>
+        <a:fillRef idx="1">
+          <a:scrgbClr r="0" g="0" b="0"/>
+        </a:fillRef>
+        <a:effectRef idx="0">
+          <a:scrgbClr r="0" g="0" b="0"/>
+        </a:effectRef>
+        <a:fontRef idx="minor">
+          <a:schemeClr val="lt1"/>
+        </a:fontRef>
+      </dsp:style>
+      <dsp:txBody>
+        <a:bodyPr spcFirstLastPara="0" vert="horz" wrap="square" lIns="83820" tIns="83820" rIns="83820" bIns="83820" numCol="1" spcCol="1270" anchor="ctr" anchorCtr="0">
+          <a:noAutofit/>
+        </a:bodyPr>
+        <a:lstStyle/>
+        <a:p>
+          <a:pPr lvl="0" algn="ctr" defTabSz="977900">
+            <a:lnSpc>
+              <a:spcPct val="90000"/>
+            </a:lnSpc>
+            <a:spcBef>
+              <a:spcPct val="0"/>
+            </a:spcBef>
+            <a:spcAft>
+              <a:spcPct val="35000"/>
+            </a:spcAft>
+          </a:pPr>
+          <a:r>
+            <a:rPr lang="en-GB" sz="2200" kern="1200" dirty="0" err="1" smtClean="0"/>
+            <a:t>Tabu</a:t>
+          </a:r>
+          <a:r>
+            <a:rPr lang="en-GB" sz="2200" kern="1200" dirty="0" smtClean="0"/>
+            <a:t> Search</a:t>
+          </a:r>
+          <a:endParaRPr lang="en-GB" sz="2200" kern="1200" dirty="0"/>
+        </a:p>
+      </dsp:txBody>
+      <dsp:txXfrm>
+        <a:off x="4517393" y="1579724"/>
+        <a:ext cx="1545106" cy="904550"/>
       </dsp:txXfrm>
     </dsp:sp>
   </dsp:spTree>
@@ -5376,6 +6723,152 @@
 </dgm:layoutDef>
 </file>
 
+<file path=ppt/diagrams/layout3.xml><?xml version="1.0" encoding="utf-8"?>
+<dgm:layoutDef xmlns:dgm="http://schemas.openxmlformats.org/drawingml/2006/diagram" xmlns:a="http://schemas.openxmlformats.org/drawingml/2006/main" uniqueId="urn:microsoft.com/office/officeart/2005/8/layout/process1">
+  <dgm:title val=""/>
+  <dgm:desc val=""/>
+  <dgm:catLst>
+    <dgm:cat type="process" pri="1000"/>
+    <dgm:cat type="convert" pri="15000"/>
+  </dgm:catLst>
+  <dgm:sampData useDef="1">
+    <dgm:dataModel>
+      <dgm:ptLst/>
+      <dgm:bg/>
+      <dgm:whole/>
+    </dgm:dataModel>
+  </dgm:sampData>
+  <dgm:styleData>
+    <dgm:dataModel>
+      <dgm:ptLst>
+        <dgm:pt modelId="0" type="doc"/>
+        <dgm:pt modelId="1"/>
+        <dgm:pt modelId="2"/>
+      </dgm:ptLst>
+      <dgm:cxnLst>
+        <dgm:cxn modelId="3" srcId="0" destId="1" srcOrd="0" destOrd="0"/>
+        <dgm:cxn modelId="4" srcId="0" destId="2" srcOrd="1" destOrd="0"/>
+      </dgm:cxnLst>
+      <dgm:bg/>
+      <dgm:whole/>
+    </dgm:dataModel>
+  </dgm:styleData>
+  <dgm:clrData>
+    <dgm:dataModel>
+      <dgm:ptLst>
+        <dgm:pt modelId="0" type="doc"/>
+        <dgm:pt modelId="1"/>
+        <dgm:pt modelId="2"/>
+        <dgm:pt modelId="3"/>
+        <dgm:pt modelId="4"/>
+      </dgm:ptLst>
+      <dgm:cxnLst>
+        <dgm:cxn modelId="5" srcId="0" destId="1" srcOrd="0" destOrd="0"/>
+        <dgm:cxn modelId="6" srcId="0" destId="2" srcOrd="1" destOrd="0"/>
+        <dgm:cxn modelId="7" srcId="0" destId="3" srcOrd="2" destOrd="0"/>
+        <dgm:cxn modelId="8" srcId="0" destId="4" srcOrd="3" destOrd="0"/>
+      </dgm:cxnLst>
+      <dgm:bg/>
+      <dgm:whole/>
+    </dgm:dataModel>
+  </dgm:clrData>
+  <dgm:layoutNode name="Name0">
+    <dgm:varLst>
+      <dgm:dir/>
+      <dgm:resizeHandles val="exact"/>
+    </dgm:varLst>
+    <dgm:choose name="Name1">
+      <dgm:if name="Name2" func="var" arg="dir" op="equ" val="norm">
+        <dgm:alg type="lin"/>
+      </dgm:if>
+      <dgm:else name="Name3">
+        <dgm:alg type="lin">
+          <dgm:param type="linDir" val="fromR"/>
+        </dgm:alg>
+      </dgm:else>
+    </dgm:choose>
+    <dgm:shape xmlns:r="http://schemas.openxmlformats.org/officeDocument/2006/relationships" r:blip="">
+      <dgm:adjLst/>
+    </dgm:shape>
+    <dgm:presOf/>
+    <dgm:constrLst>
+      <dgm:constr type="w" for="ch" ptType="node" refType="w"/>
+      <dgm:constr type="h" for="ch" ptType="node" op="equ"/>
+      <dgm:constr type="primFontSz" for="ch" ptType="node" op="equ" val="65"/>
+      <dgm:constr type="w" for="ch" ptType="sibTrans" refType="w" refFor="ch" refPtType="node" op="equ" fact="0.4"/>
+      <dgm:constr type="h" for="ch" ptType="sibTrans" op="equ"/>
+      <dgm:constr type="primFontSz" for="des" forName="connectorText" op="equ" val="55"/>
+      <dgm:constr type="primFontSz" for="des" forName="connectorText" refType="primFontSz" refFor="ch" refPtType="node" op="lte" fact="0.8"/>
+    </dgm:constrLst>
+    <dgm:ruleLst/>
+    <dgm:forEach name="nodesForEach" axis="ch" ptType="node">
+      <dgm:layoutNode name="node">
+        <dgm:varLst>
+          <dgm:bulletEnabled val="1"/>
+        </dgm:varLst>
+        <dgm:alg type="tx"/>
+        <dgm:shape xmlns:r="http://schemas.openxmlformats.org/officeDocument/2006/relationships" type="roundRect" r:blip="">
+          <dgm:adjLst>
+            <dgm:adj idx="1" val="0.1"/>
+          </dgm:adjLst>
+        </dgm:shape>
+        <dgm:presOf axis="desOrSelf" ptType="node"/>
+        <dgm:constrLst>
+          <dgm:constr type="h" refType="w" fact="0.6"/>
+          <dgm:constr type="tMarg" refType="primFontSz" fact="0.3"/>
+          <dgm:constr type="bMarg" refType="primFontSz" fact="0.3"/>
+          <dgm:constr type="lMarg" refType="primFontSz" fact="0.3"/>
+          <dgm:constr type="rMarg" refType="primFontSz" fact="0.3"/>
+        </dgm:constrLst>
+        <dgm:ruleLst>
+          <dgm:rule type="primFontSz" val="18" fact="NaN" max="NaN"/>
+          <dgm:rule type="h" val="NaN" fact="1.5" max="NaN"/>
+          <dgm:rule type="primFontSz" val="5" fact="NaN" max="NaN"/>
+          <dgm:rule type="h" val="INF" fact="NaN" max="NaN"/>
+        </dgm:ruleLst>
+      </dgm:layoutNode>
+      <dgm:forEach name="sibTransForEach" axis="followSib" ptType="sibTrans" cnt="1">
+        <dgm:layoutNode name="sibTrans">
+          <dgm:alg type="conn">
+            <dgm:param type="begPts" val="auto"/>
+            <dgm:param type="endPts" val="auto"/>
+          </dgm:alg>
+          <dgm:shape xmlns:r="http://schemas.openxmlformats.org/officeDocument/2006/relationships" type="conn" r:blip="">
+            <dgm:adjLst/>
+          </dgm:shape>
+          <dgm:presOf axis="self"/>
+          <dgm:constrLst>
+            <dgm:constr type="h" refType="w" fact="0.62"/>
+            <dgm:constr type="connDist"/>
+            <dgm:constr type="begPad" refType="connDist" fact="0.25"/>
+            <dgm:constr type="endPad" refType="connDist" fact="0.22"/>
+          </dgm:constrLst>
+          <dgm:ruleLst/>
+          <dgm:layoutNode name="connectorText">
+            <dgm:alg type="tx">
+              <dgm:param type="autoTxRot" val="grav"/>
+            </dgm:alg>
+            <dgm:shape xmlns:r="http://schemas.openxmlformats.org/officeDocument/2006/relationships" type="conn" r:blip="" hideGeom="1">
+              <dgm:adjLst/>
+            </dgm:shape>
+            <dgm:presOf axis="self"/>
+            <dgm:constrLst>
+              <dgm:constr type="lMarg"/>
+              <dgm:constr type="rMarg"/>
+              <dgm:constr type="tMarg"/>
+              <dgm:constr type="bMarg"/>
+            </dgm:constrLst>
+            <dgm:ruleLst>
+              <dgm:rule type="primFontSz" val="5" fact="NaN" max="NaN"/>
+            </dgm:ruleLst>
+          </dgm:layoutNode>
+        </dgm:layoutNode>
+      </dgm:forEach>
+    </dgm:forEach>
+  </dgm:layoutNode>
+</dgm:layoutDef>
+</file>
+
 <file path=ppt/diagrams/quickStyle1.xml><?xml version="1.0" encoding="utf-8"?>
 <dgm:styleDef xmlns:dgm="http://schemas.openxmlformats.org/drawingml/2006/diagram" xmlns:a="http://schemas.openxmlformats.org/drawingml/2006/main" uniqueId="urn:microsoft.com/office/officeart/2005/8/quickstyle/simple1">
   <dgm:title val=""/>
@@ -6411,6 +7904,1040 @@
 </file>
 
 <file path=ppt/diagrams/quickStyle2.xml><?xml version="1.0" encoding="utf-8"?>
+<dgm:styleDef xmlns:dgm="http://schemas.openxmlformats.org/drawingml/2006/diagram" xmlns:a="http://schemas.openxmlformats.org/drawingml/2006/main" uniqueId="urn:microsoft.com/office/officeart/2005/8/quickstyle/simple1">
+  <dgm:title val=""/>
+  <dgm:desc val=""/>
+  <dgm:catLst>
+    <dgm:cat type="simple" pri="10100"/>
+  </dgm:catLst>
+  <dgm:scene3d>
+    <a:camera prst="orthographicFront"/>
+    <a:lightRig rig="threePt" dir="t"/>
+  </dgm:scene3d>
+  <dgm:styleLbl name="node0">
+    <dgm:scene3d>
+      <a:camera prst="orthographicFront"/>
+      <a:lightRig rig="threePt" dir="t"/>
+    </dgm:scene3d>
+    <dgm:sp3d/>
+    <dgm:txPr/>
+    <dgm:style>
+      <a:lnRef idx="2">
+        <a:scrgbClr r="0" g="0" b="0"/>
+      </a:lnRef>
+      <a:fillRef idx="1">
+        <a:scrgbClr r="0" g="0" b="0"/>
+      </a:fillRef>
+      <a:effectRef idx="0">
+        <a:scrgbClr r="0" g="0" b="0"/>
+      </a:effectRef>
+      <a:fontRef idx="minor">
+        <a:schemeClr val="lt1"/>
+      </a:fontRef>
+    </dgm:style>
+  </dgm:styleLbl>
+  <dgm:styleLbl name="lnNode1">
+    <dgm:scene3d>
+      <a:camera prst="orthographicFront"/>
+      <a:lightRig rig="threePt" dir="t"/>
+    </dgm:scene3d>
+    <dgm:sp3d/>
+    <dgm:txPr/>
+    <dgm:style>
+      <a:lnRef idx="2">
+        <a:scrgbClr r="0" g="0" b="0"/>
+      </a:lnRef>
+      <a:fillRef idx="1">
+        <a:scrgbClr r="0" g="0" b="0"/>
+      </a:fillRef>
+      <a:effectRef idx="0">
+        <a:scrgbClr r="0" g="0" b="0"/>
+      </a:effectRef>
+      <a:fontRef idx="minor">
+        <a:schemeClr val="lt1"/>
+      </a:fontRef>
+    </dgm:style>
+  </dgm:styleLbl>
+  <dgm:styleLbl name="vennNode1">
+    <dgm:scene3d>
+      <a:camera prst="orthographicFront"/>
+      <a:lightRig rig="threePt" dir="t"/>
+    </dgm:scene3d>
+    <dgm:sp3d/>
+    <dgm:txPr/>
+    <dgm:style>
+      <a:lnRef idx="2">
+        <a:scrgbClr r="0" g="0" b="0"/>
+      </a:lnRef>
+      <a:fillRef idx="1">
+        <a:scrgbClr r="0" g="0" b="0"/>
+      </a:fillRef>
+      <a:effectRef idx="0">
+        <a:scrgbClr r="0" g="0" b="0"/>
+      </a:effectRef>
+      <a:fontRef idx="minor">
+        <a:schemeClr val="tx1"/>
+      </a:fontRef>
+    </dgm:style>
+  </dgm:styleLbl>
+  <dgm:styleLbl name="alignNode1">
+    <dgm:scene3d>
+      <a:camera prst="orthographicFront"/>
+      <a:lightRig rig="threePt" dir="t"/>
+    </dgm:scene3d>
+    <dgm:sp3d/>
+    <dgm:txPr/>
+    <dgm:style>
+      <a:lnRef idx="2">
+        <a:scrgbClr r="0" g="0" b="0"/>
+      </a:lnRef>
+      <a:fillRef idx="1">
+        <a:scrgbClr r="0" g="0" b="0"/>
+      </a:fillRef>
+      <a:effectRef idx="0">
+        <a:scrgbClr r="0" g="0" b="0"/>
+      </a:effectRef>
+      <a:fontRef idx="minor">
+        <a:schemeClr val="lt1"/>
+      </a:fontRef>
+    </dgm:style>
+  </dgm:styleLbl>
+  <dgm:styleLbl name="node1">
+    <dgm:scene3d>
+      <a:camera prst="orthographicFront"/>
+      <a:lightRig rig="threePt" dir="t"/>
+    </dgm:scene3d>
+    <dgm:sp3d/>
+    <dgm:txPr/>
+    <dgm:style>
+      <a:lnRef idx="2">
+        <a:scrgbClr r="0" g="0" b="0"/>
+      </a:lnRef>
+      <a:fillRef idx="1">
+        <a:scrgbClr r="0" g="0" b="0"/>
+      </a:fillRef>
+      <a:effectRef idx="0">
+        <a:scrgbClr r="0" g="0" b="0"/>
+      </a:effectRef>
+      <a:fontRef idx="minor">
+        <a:schemeClr val="lt1"/>
+      </a:fontRef>
+    </dgm:style>
+  </dgm:styleLbl>
+  <dgm:styleLbl name="node2">
+    <dgm:scene3d>
+      <a:camera prst="orthographicFront"/>
+      <a:lightRig rig="threePt" dir="t"/>
+    </dgm:scene3d>
+    <dgm:sp3d/>
+    <dgm:txPr/>
+    <dgm:style>
+      <a:lnRef idx="2">
+        <a:scrgbClr r="0" g="0" b="0"/>
+      </a:lnRef>
+      <a:fillRef idx="1">
+        <a:scrgbClr r="0" g="0" b="0"/>
+      </a:fillRef>
+      <a:effectRef idx="0">
+        <a:scrgbClr r="0" g="0" b="0"/>
+      </a:effectRef>
+      <a:fontRef idx="minor">
+        <a:schemeClr val="lt1"/>
+      </a:fontRef>
+    </dgm:style>
+  </dgm:styleLbl>
+  <dgm:styleLbl name="node3">
+    <dgm:scene3d>
+      <a:camera prst="orthographicFront"/>
+      <a:lightRig rig="threePt" dir="t"/>
+    </dgm:scene3d>
+    <dgm:sp3d/>
+    <dgm:txPr/>
+    <dgm:style>
+      <a:lnRef idx="2">
+        <a:scrgbClr r="0" g="0" b="0"/>
+      </a:lnRef>
+      <a:fillRef idx="1">
+        <a:scrgbClr r="0" g="0" b="0"/>
+      </a:fillRef>
+      <a:effectRef idx="0">
+        <a:scrgbClr r="0" g="0" b="0"/>
+      </a:effectRef>
+      <a:fontRef idx="minor">
+        <a:schemeClr val="lt1"/>
+      </a:fontRef>
+    </dgm:style>
+  </dgm:styleLbl>
+  <dgm:styleLbl name="node4">
+    <dgm:scene3d>
+      <a:camera prst="orthographicFront"/>
+      <a:lightRig rig="threePt" dir="t"/>
+    </dgm:scene3d>
+    <dgm:sp3d/>
+    <dgm:txPr/>
+    <dgm:style>
+      <a:lnRef idx="2">
+        <a:scrgbClr r="0" g="0" b="0"/>
+      </a:lnRef>
+      <a:fillRef idx="1">
+        <a:scrgbClr r="0" g="0" b="0"/>
+      </a:fillRef>
+      <a:effectRef idx="0">
+        <a:scrgbClr r="0" g="0" b="0"/>
+      </a:effectRef>
+      <a:fontRef idx="minor">
+        <a:schemeClr val="lt1"/>
+      </a:fontRef>
+    </dgm:style>
+  </dgm:styleLbl>
+  <dgm:styleLbl name="fgImgPlace1">
+    <dgm:scene3d>
+      <a:camera prst="orthographicFront"/>
+      <a:lightRig rig="threePt" dir="t"/>
+    </dgm:scene3d>
+    <dgm:sp3d/>
+    <dgm:txPr/>
+    <dgm:style>
+      <a:lnRef idx="2">
+        <a:scrgbClr r="0" g="0" b="0"/>
+      </a:lnRef>
+      <a:fillRef idx="1">
+        <a:scrgbClr r="0" g="0" b="0"/>
+      </a:fillRef>
+      <a:effectRef idx="0">
+        <a:scrgbClr r="0" g="0" b="0"/>
+      </a:effectRef>
+      <a:fontRef idx="minor"/>
+    </dgm:style>
+  </dgm:styleLbl>
+  <dgm:styleLbl name="alignImgPlace1">
+    <dgm:scene3d>
+      <a:camera prst="orthographicFront"/>
+      <a:lightRig rig="threePt" dir="t"/>
+    </dgm:scene3d>
+    <dgm:sp3d/>
+    <dgm:txPr/>
+    <dgm:style>
+      <a:lnRef idx="2">
+        <a:scrgbClr r="0" g="0" b="0"/>
+      </a:lnRef>
+      <a:fillRef idx="1">
+        <a:scrgbClr r="0" g="0" b="0"/>
+      </a:fillRef>
+      <a:effectRef idx="0">
+        <a:scrgbClr r="0" g="0" b="0"/>
+      </a:effectRef>
+      <a:fontRef idx="minor"/>
+    </dgm:style>
+  </dgm:styleLbl>
+  <dgm:styleLbl name="bgImgPlace1">
+    <dgm:scene3d>
+      <a:camera prst="orthographicFront"/>
+      <a:lightRig rig="threePt" dir="t"/>
+    </dgm:scene3d>
+    <dgm:sp3d/>
+    <dgm:txPr/>
+    <dgm:style>
+      <a:lnRef idx="2">
+        <a:scrgbClr r="0" g="0" b="0"/>
+      </a:lnRef>
+      <a:fillRef idx="1">
+        <a:scrgbClr r="0" g="0" b="0"/>
+      </a:fillRef>
+      <a:effectRef idx="0">
+        <a:scrgbClr r="0" g="0" b="0"/>
+      </a:effectRef>
+      <a:fontRef idx="minor"/>
+    </dgm:style>
+  </dgm:styleLbl>
+  <dgm:styleLbl name="sibTrans2D1">
+    <dgm:scene3d>
+      <a:camera prst="orthographicFront"/>
+      <a:lightRig rig="threePt" dir="t"/>
+    </dgm:scene3d>
+    <dgm:sp3d/>
+    <dgm:txPr/>
+    <dgm:style>
+      <a:lnRef idx="0">
+        <a:scrgbClr r="0" g="0" b="0"/>
+      </a:lnRef>
+      <a:fillRef idx="1">
+        <a:scrgbClr r="0" g="0" b="0"/>
+      </a:fillRef>
+      <a:effectRef idx="0">
+        <a:scrgbClr r="0" g="0" b="0"/>
+      </a:effectRef>
+      <a:fontRef idx="minor">
+        <a:schemeClr val="lt1"/>
+      </a:fontRef>
+    </dgm:style>
+  </dgm:styleLbl>
+  <dgm:styleLbl name="fgSibTrans2D1">
+    <dgm:scene3d>
+      <a:camera prst="orthographicFront"/>
+      <a:lightRig rig="threePt" dir="t"/>
+    </dgm:scene3d>
+    <dgm:sp3d/>
+    <dgm:txPr/>
+    <dgm:style>
+      <a:lnRef idx="0">
+        <a:scrgbClr r="0" g="0" b="0"/>
+      </a:lnRef>
+      <a:fillRef idx="1">
+        <a:scrgbClr r="0" g="0" b="0"/>
+      </a:fillRef>
+      <a:effectRef idx="0">
+        <a:scrgbClr r="0" g="0" b="0"/>
+      </a:effectRef>
+      <a:fontRef idx="minor">
+        <a:schemeClr val="lt1"/>
+      </a:fontRef>
+    </dgm:style>
+  </dgm:styleLbl>
+  <dgm:styleLbl name="bgSibTrans2D1">
+    <dgm:scene3d>
+      <a:camera prst="orthographicFront"/>
+      <a:lightRig rig="threePt" dir="t"/>
+    </dgm:scene3d>
+    <dgm:sp3d/>
+    <dgm:txPr/>
+    <dgm:style>
+      <a:lnRef idx="0">
+        <a:scrgbClr r="0" g="0" b="0"/>
+      </a:lnRef>
+      <a:fillRef idx="1">
+        <a:scrgbClr r="0" g="0" b="0"/>
+      </a:fillRef>
+      <a:effectRef idx="0">
+        <a:scrgbClr r="0" g="0" b="0"/>
+      </a:effectRef>
+      <a:fontRef idx="minor">
+        <a:schemeClr val="lt1"/>
+      </a:fontRef>
+    </dgm:style>
+  </dgm:styleLbl>
+  <dgm:styleLbl name="sibTrans1D1">
+    <dgm:scene3d>
+      <a:camera prst="orthographicFront"/>
+      <a:lightRig rig="threePt" dir="t"/>
+    </dgm:scene3d>
+    <dgm:sp3d/>
+    <dgm:txPr/>
+    <dgm:style>
+      <a:lnRef idx="1">
+        <a:scrgbClr r="0" g="0" b="0"/>
+      </a:lnRef>
+      <a:fillRef idx="0">
+        <a:scrgbClr r="0" g="0" b="0"/>
+      </a:fillRef>
+      <a:effectRef idx="0">
+        <a:scrgbClr r="0" g="0" b="0"/>
+      </a:effectRef>
+      <a:fontRef idx="minor"/>
+    </dgm:style>
+  </dgm:styleLbl>
+  <dgm:styleLbl name="callout">
+    <dgm:scene3d>
+      <a:camera prst="orthographicFront"/>
+      <a:lightRig rig="threePt" dir="t"/>
+    </dgm:scene3d>
+    <dgm:sp3d/>
+    <dgm:txPr/>
+    <dgm:style>
+      <a:lnRef idx="2">
+        <a:scrgbClr r="0" g="0" b="0"/>
+      </a:lnRef>
+      <a:fillRef idx="1">
+        <a:scrgbClr r="0" g="0" b="0"/>
+      </a:fillRef>
+      <a:effectRef idx="0">
+        <a:scrgbClr r="0" g="0" b="0"/>
+      </a:effectRef>
+      <a:fontRef idx="minor"/>
+    </dgm:style>
+  </dgm:styleLbl>
+  <dgm:styleLbl name="asst0">
+    <dgm:scene3d>
+      <a:camera prst="orthographicFront"/>
+      <a:lightRig rig="threePt" dir="t"/>
+    </dgm:scene3d>
+    <dgm:sp3d/>
+    <dgm:txPr/>
+    <dgm:style>
+      <a:lnRef idx="2">
+        <a:scrgbClr r="0" g="0" b="0"/>
+      </a:lnRef>
+      <a:fillRef idx="1">
+        <a:scrgbClr r="0" g="0" b="0"/>
+      </a:fillRef>
+      <a:effectRef idx="0">
+        <a:scrgbClr r="0" g="0" b="0"/>
+      </a:effectRef>
+      <a:fontRef idx="minor">
+        <a:schemeClr val="lt1"/>
+      </a:fontRef>
+    </dgm:style>
+  </dgm:styleLbl>
+  <dgm:styleLbl name="asst1">
+    <dgm:scene3d>
+      <a:camera prst="orthographicFront"/>
+      <a:lightRig rig="threePt" dir="t"/>
+    </dgm:scene3d>
+    <dgm:sp3d/>
+    <dgm:txPr/>
+    <dgm:style>
+      <a:lnRef idx="2">
+        <a:scrgbClr r="0" g="0" b="0"/>
+      </a:lnRef>
+      <a:fillRef idx="1">
+        <a:scrgbClr r="0" g="0" b="0"/>
+      </a:fillRef>
+      <a:effectRef idx="0">
+        <a:scrgbClr r="0" g="0" b="0"/>
+      </a:effectRef>
+      <a:fontRef idx="minor">
+        <a:schemeClr val="lt1"/>
+      </a:fontRef>
+    </dgm:style>
+  </dgm:styleLbl>
+  <dgm:styleLbl name="asst2">
+    <dgm:scene3d>
+      <a:camera prst="orthographicFront"/>
+      <a:lightRig rig="threePt" dir="t"/>
+    </dgm:scene3d>
+    <dgm:sp3d/>
+    <dgm:txPr/>
+    <dgm:style>
+      <a:lnRef idx="2">
+        <a:scrgbClr r="0" g="0" b="0"/>
+      </a:lnRef>
+      <a:fillRef idx="1">
+        <a:scrgbClr r="0" g="0" b="0"/>
+      </a:fillRef>
+      <a:effectRef idx="0">
+        <a:scrgbClr r="0" g="0" b="0"/>
+      </a:effectRef>
+      <a:fontRef idx="minor">
+        <a:schemeClr val="lt1"/>
+      </a:fontRef>
+    </dgm:style>
+  </dgm:styleLbl>
+  <dgm:styleLbl name="asst3">
+    <dgm:scene3d>
+      <a:camera prst="orthographicFront"/>
+      <a:lightRig rig="threePt" dir="t"/>
+    </dgm:scene3d>
+    <dgm:sp3d/>
+    <dgm:txPr/>
+    <dgm:style>
+      <a:lnRef idx="2">
+        <a:scrgbClr r="0" g="0" b="0"/>
+      </a:lnRef>
+      <a:fillRef idx="1">
+        <a:scrgbClr r="0" g="0" b="0"/>
+      </a:fillRef>
+      <a:effectRef idx="0">
+        <a:scrgbClr r="0" g="0" b="0"/>
+      </a:effectRef>
+      <a:fontRef idx="minor">
+        <a:schemeClr val="lt1"/>
+      </a:fontRef>
+    </dgm:style>
+  </dgm:styleLbl>
+  <dgm:styleLbl name="asst4">
+    <dgm:scene3d>
+      <a:camera prst="orthographicFront"/>
+      <a:lightRig rig="threePt" dir="t"/>
+    </dgm:scene3d>
+    <dgm:sp3d/>
+    <dgm:txPr/>
+    <dgm:style>
+      <a:lnRef idx="2">
+        <a:scrgbClr r="0" g="0" b="0"/>
+      </a:lnRef>
+      <a:fillRef idx="1">
+        <a:scrgbClr r="0" g="0" b="0"/>
+      </a:fillRef>
+      <a:effectRef idx="0">
+        <a:scrgbClr r="0" g="0" b="0"/>
+      </a:effectRef>
+      <a:fontRef idx="minor">
+        <a:schemeClr val="lt1"/>
+      </a:fontRef>
+    </dgm:style>
+  </dgm:styleLbl>
+  <dgm:styleLbl name="parChTrans2D1">
+    <dgm:scene3d>
+      <a:camera prst="orthographicFront"/>
+      <a:lightRig rig="threePt" dir="t"/>
+    </dgm:scene3d>
+    <dgm:sp3d/>
+    <dgm:txPr/>
+    <dgm:style>
+      <a:lnRef idx="2">
+        <a:scrgbClr r="0" g="0" b="0"/>
+      </a:lnRef>
+      <a:fillRef idx="1">
+        <a:scrgbClr r="0" g="0" b="0"/>
+      </a:fillRef>
+      <a:effectRef idx="0">
+        <a:scrgbClr r="0" g="0" b="0"/>
+      </a:effectRef>
+      <a:fontRef idx="minor">
+        <a:schemeClr val="lt1"/>
+      </a:fontRef>
+    </dgm:style>
+  </dgm:styleLbl>
+  <dgm:styleLbl name="parChTrans2D2">
+    <dgm:scene3d>
+      <a:camera prst="orthographicFront"/>
+      <a:lightRig rig="threePt" dir="t"/>
+    </dgm:scene3d>
+    <dgm:sp3d/>
+    <dgm:txPr/>
+    <dgm:style>
+      <a:lnRef idx="2">
+        <a:scrgbClr r="0" g="0" b="0"/>
+      </a:lnRef>
+      <a:fillRef idx="1">
+        <a:scrgbClr r="0" g="0" b="0"/>
+      </a:fillRef>
+      <a:effectRef idx="0">
+        <a:scrgbClr r="0" g="0" b="0"/>
+      </a:effectRef>
+      <a:fontRef idx="minor">
+        <a:schemeClr val="lt1"/>
+      </a:fontRef>
+    </dgm:style>
+  </dgm:styleLbl>
+  <dgm:styleLbl name="parChTrans2D3">
+    <dgm:scene3d>
+      <a:camera prst="orthographicFront"/>
+      <a:lightRig rig="threePt" dir="t"/>
+    </dgm:scene3d>
+    <dgm:sp3d/>
+    <dgm:txPr/>
+    <dgm:style>
+      <a:lnRef idx="2">
+        <a:scrgbClr r="0" g="0" b="0"/>
+      </a:lnRef>
+      <a:fillRef idx="1">
+        <a:scrgbClr r="0" g="0" b="0"/>
+      </a:fillRef>
+      <a:effectRef idx="0">
+        <a:scrgbClr r="0" g="0" b="0"/>
+      </a:effectRef>
+      <a:fontRef idx="minor">
+        <a:schemeClr val="lt1"/>
+      </a:fontRef>
+    </dgm:style>
+  </dgm:styleLbl>
+  <dgm:styleLbl name="parChTrans2D4">
+    <dgm:scene3d>
+      <a:camera prst="orthographicFront"/>
+      <a:lightRig rig="threePt" dir="t"/>
+    </dgm:scene3d>
+    <dgm:sp3d/>
+    <dgm:txPr/>
+    <dgm:style>
+      <a:lnRef idx="2">
+        <a:scrgbClr r="0" g="0" b="0"/>
+      </a:lnRef>
+      <a:fillRef idx="1">
+        <a:scrgbClr r="0" g="0" b="0"/>
+      </a:fillRef>
+      <a:effectRef idx="0">
+        <a:scrgbClr r="0" g="0" b="0"/>
+      </a:effectRef>
+      <a:fontRef idx="minor">
+        <a:schemeClr val="lt1"/>
+      </a:fontRef>
+    </dgm:style>
+  </dgm:styleLbl>
+  <dgm:styleLbl name="parChTrans1D1">
+    <dgm:scene3d>
+      <a:camera prst="orthographicFront"/>
+      <a:lightRig rig="threePt" dir="t"/>
+    </dgm:scene3d>
+    <dgm:sp3d/>
+    <dgm:txPr/>
+    <dgm:style>
+      <a:lnRef idx="2">
+        <a:scrgbClr r="0" g="0" b="0"/>
+      </a:lnRef>
+      <a:fillRef idx="0">
+        <a:scrgbClr r="0" g="0" b="0"/>
+      </a:fillRef>
+      <a:effectRef idx="0">
+        <a:scrgbClr r="0" g="0" b="0"/>
+      </a:effectRef>
+      <a:fontRef idx="minor"/>
+    </dgm:style>
+  </dgm:styleLbl>
+  <dgm:styleLbl name="parChTrans1D2">
+    <dgm:scene3d>
+      <a:camera prst="orthographicFront"/>
+      <a:lightRig rig="threePt" dir="t"/>
+    </dgm:scene3d>
+    <dgm:sp3d/>
+    <dgm:txPr/>
+    <dgm:style>
+      <a:lnRef idx="2">
+        <a:scrgbClr r="0" g="0" b="0"/>
+      </a:lnRef>
+      <a:fillRef idx="0">
+        <a:scrgbClr r="0" g="0" b="0"/>
+      </a:fillRef>
+      <a:effectRef idx="0">
+        <a:scrgbClr r="0" g="0" b="0"/>
+      </a:effectRef>
+      <a:fontRef idx="minor"/>
+    </dgm:style>
+  </dgm:styleLbl>
+  <dgm:styleLbl name="parChTrans1D3">
+    <dgm:scene3d>
+      <a:camera prst="orthographicFront"/>
+      <a:lightRig rig="threePt" dir="t"/>
+    </dgm:scene3d>
+    <dgm:sp3d/>
+    <dgm:txPr/>
+    <dgm:style>
+      <a:lnRef idx="2">
+        <a:scrgbClr r="0" g="0" b="0"/>
+      </a:lnRef>
+      <a:fillRef idx="0">
+        <a:scrgbClr r="0" g="0" b="0"/>
+      </a:fillRef>
+      <a:effectRef idx="0">
+        <a:scrgbClr r="0" g="0" b="0"/>
+      </a:effectRef>
+      <a:fontRef idx="minor"/>
+    </dgm:style>
+  </dgm:styleLbl>
+  <dgm:styleLbl name="parChTrans1D4">
+    <dgm:scene3d>
+      <a:camera prst="orthographicFront"/>
+      <a:lightRig rig="threePt" dir="t"/>
+    </dgm:scene3d>
+    <dgm:sp3d/>
+    <dgm:txPr/>
+    <dgm:style>
+      <a:lnRef idx="2">
+        <a:scrgbClr r="0" g="0" b="0"/>
+      </a:lnRef>
+      <a:fillRef idx="0">
+        <a:scrgbClr r="0" g="0" b="0"/>
+      </a:fillRef>
+      <a:effectRef idx="0">
+        <a:scrgbClr r="0" g="0" b="0"/>
+      </a:effectRef>
+      <a:fontRef idx="minor"/>
+    </dgm:style>
+  </dgm:styleLbl>
+  <dgm:styleLbl name="fgAcc1">
+    <dgm:scene3d>
+      <a:camera prst="orthographicFront"/>
+      <a:lightRig rig="threePt" dir="t"/>
+    </dgm:scene3d>
+    <dgm:sp3d/>
+    <dgm:txPr/>
+    <dgm:style>
+      <a:lnRef idx="2">
+        <a:scrgbClr r="0" g="0" b="0"/>
+      </a:lnRef>
+      <a:fillRef idx="1">
+        <a:scrgbClr r="0" g="0" b="0"/>
+      </a:fillRef>
+      <a:effectRef idx="0">
+        <a:scrgbClr r="0" g="0" b="0"/>
+      </a:effectRef>
+      <a:fontRef idx="minor"/>
+    </dgm:style>
+  </dgm:styleLbl>
+  <dgm:styleLbl name="conFgAcc1">
+    <dgm:scene3d>
+      <a:camera prst="orthographicFront"/>
+      <a:lightRig rig="threePt" dir="t"/>
+    </dgm:scene3d>
+    <dgm:sp3d/>
+    <dgm:txPr/>
+    <dgm:style>
+      <a:lnRef idx="2">
+        <a:scrgbClr r="0" g="0" b="0"/>
+      </a:lnRef>
+      <a:fillRef idx="1">
+        <a:scrgbClr r="0" g="0" b="0"/>
+      </a:fillRef>
+      <a:effectRef idx="0">
+        <a:scrgbClr r="0" g="0" b="0"/>
+      </a:effectRef>
+      <a:fontRef idx="minor"/>
+    </dgm:style>
+  </dgm:styleLbl>
+  <dgm:styleLbl name="alignAcc1">
+    <dgm:scene3d>
+      <a:camera prst="orthographicFront"/>
+      <a:lightRig rig="threePt" dir="t"/>
+    </dgm:scene3d>
+    <dgm:sp3d/>
+    <dgm:txPr/>
+    <dgm:style>
+      <a:lnRef idx="2">
+        <a:scrgbClr r="0" g="0" b="0"/>
+      </a:lnRef>
+      <a:fillRef idx="1">
+        <a:scrgbClr r="0" g="0" b="0"/>
+      </a:fillRef>
+      <a:effectRef idx="0">
+        <a:scrgbClr r="0" g="0" b="0"/>
+      </a:effectRef>
+      <a:fontRef idx="minor"/>
+    </dgm:style>
+  </dgm:styleLbl>
+  <dgm:styleLbl name="trAlignAcc1">
+    <dgm:scene3d>
+      <a:camera prst="orthographicFront"/>
+      <a:lightRig rig="threePt" dir="t"/>
+    </dgm:scene3d>
+    <dgm:sp3d/>
+    <dgm:txPr/>
+    <dgm:style>
+      <a:lnRef idx="1">
+        <a:scrgbClr r="0" g="0" b="0"/>
+      </a:lnRef>
+      <a:fillRef idx="1">
+        <a:scrgbClr r="0" g="0" b="0"/>
+      </a:fillRef>
+      <a:effectRef idx="0">
+        <a:scrgbClr r="0" g="0" b="0"/>
+      </a:effectRef>
+      <a:fontRef idx="minor"/>
+    </dgm:style>
+  </dgm:styleLbl>
+  <dgm:styleLbl name="bgAcc1">
+    <dgm:scene3d>
+      <a:camera prst="orthographicFront"/>
+      <a:lightRig rig="threePt" dir="t"/>
+    </dgm:scene3d>
+    <dgm:sp3d/>
+    <dgm:txPr/>
+    <dgm:style>
+      <a:lnRef idx="2">
+        <a:scrgbClr r="0" g="0" b="0"/>
+      </a:lnRef>
+      <a:fillRef idx="1">
+        <a:scrgbClr r="0" g="0" b="0"/>
+      </a:fillRef>
+      <a:effectRef idx="0">
+        <a:scrgbClr r="0" g="0" b="0"/>
+      </a:effectRef>
+      <a:fontRef idx="minor"/>
+    </dgm:style>
+  </dgm:styleLbl>
+  <dgm:styleLbl name="solidFgAcc1">
+    <dgm:scene3d>
+      <a:camera prst="orthographicFront"/>
+      <a:lightRig rig="threePt" dir="t"/>
+    </dgm:scene3d>
+    <dgm:sp3d/>
+    <dgm:txPr/>
+    <dgm:style>
+      <a:lnRef idx="2">
+        <a:scrgbClr r="0" g="0" b="0"/>
+      </a:lnRef>
+      <a:fillRef idx="1">
+        <a:scrgbClr r="0" g="0" b="0"/>
+      </a:fillRef>
+      <a:effectRef idx="0">
+        <a:scrgbClr r="0" g="0" b="0"/>
+      </a:effectRef>
+      <a:fontRef idx="minor"/>
+    </dgm:style>
+  </dgm:styleLbl>
+  <dgm:styleLbl name="solidAlignAcc1">
+    <dgm:scene3d>
+      <a:camera prst="orthographicFront"/>
+      <a:lightRig rig="threePt" dir="t"/>
+    </dgm:scene3d>
+    <dgm:sp3d/>
+    <dgm:txPr/>
+    <dgm:style>
+      <a:lnRef idx="2">
+        <a:scrgbClr r="0" g="0" b="0"/>
+      </a:lnRef>
+      <a:fillRef idx="1">
+        <a:scrgbClr r="0" g="0" b="0"/>
+      </a:fillRef>
+      <a:effectRef idx="0">
+        <a:scrgbClr r="0" g="0" b="0"/>
+      </a:effectRef>
+      <a:fontRef idx="minor"/>
+    </dgm:style>
+  </dgm:styleLbl>
+  <dgm:styleLbl name="solidBgAcc1">
+    <dgm:scene3d>
+      <a:camera prst="orthographicFront"/>
+      <a:lightRig rig="threePt" dir="t"/>
+    </dgm:scene3d>
+    <dgm:sp3d/>
+    <dgm:txPr/>
+    <dgm:style>
+      <a:lnRef idx="2">
+        <a:scrgbClr r="0" g="0" b="0"/>
+      </a:lnRef>
+      <a:fillRef idx="1">
+        <a:scrgbClr r="0" g="0" b="0"/>
+      </a:fillRef>
+      <a:effectRef idx="0">
+        <a:scrgbClr r="0" g="0" b="0"/>
+      </a:effectRef>
+      <a:fontRef idx="minor"/>
+    </dgm:style>
+  </dgm:styleLbl>
+  <dgm:styleLbl name="fgAccFollowNode1">
+    <dgm:scene3d>
+      <a:camera prst="orthographicFront"/>
+      <a:lightRig rig="threePt" dir="t"/>
+    </dgm:scene3d>
+    <dgm:sp3d/>
+    <dgm:txPr/>
+    <dgm:style>
+      <a:lnRef idx="2">
+        <a:scrgbClr r="0" g="0" b="0"/>
+      </a:lnRef>
+      <a:fillRef idx="1">
+        <a:scrgbClr r="0" g="0" b="0"/>
+      </a:fillRef>
+      <a:effectRef idx="0">
+        <a:scrgbClr r="0" g="0" b="0"/>
+      </a:effectRef>
+      <a:fontRef idx="minor"/>
+    </dgm:style>
+  </dgm:styleLbl>
+  <dgm:styleLbl name="alignAccFollowNode1">
+    <dgm:scene3d>
+      <a:camera prst="orthographicFront"/>
+      <a:lightRig rig="threePt" dir="t"/>
+    </dgm:scene3d>
+    <dgm:sp3d/>
+    <dgm:txPr/>
+    <dgm:style>
+      <a:lnRef idx="2">
+        <a:scrgbClr r="0" g="0" b="0"/>
+      </a:lnRef>
+      <a:fillRef idx="1">
+        <a:scrgbClr r="0" g="0" b="0"/>
+      </a:fillRef>
+      <a:effectRef idx="0">
+        <a:scrgbClr r="0" g="0" b="0"/>
+      </a:effectRef>
+      <a:fontRef idx="minor"/>
+    </dgm:style>
+  </dgm:styleLbl>
+  <dgm:styleLbl name="bgAccFollowNode1">
+    <dgm:scene3d>
+      <a:camera prst="orthographicFront"/>
+      <a:lightRig rig="threePt" dir="t"/>
+    </dgm:scene3d>
+    <dgm:sp3d/>
+    <dgm:txPr/>
+    <dgm:style>
+      <a:lnRef idx="2">
+        <a:scrgbClr r="0" g="0" b="0"/>
+      </a:lnRef>
+      <a:fillRef idx="1">
+        <a:scrgbClr r="0" g="0" b="0"/>
+      </a:fillRef>
+      <a:effectRef idx="0">
+        <a:scrgbClr r="0" g="0" b="0"/>
+      </a:effectRef>
+      <a:fontRef idx="minor"/>
+    </dgm:style>
+  </dgm:styleLbl>
+  <dgm:styleLbl name="fgAcc0">
+    <dgm:scene3d>
+      <a:camera prst="orthographicFront"/>
+      <a:lightRig rig="threePt" dir="t"/>
+    </dgm:scene3d>
+    <dgm:sp3d/>
+    <dgm:txPr/>
+    <dgm:style>
+      <a:lnRef idx="2">
+        <a:scrgbClr r="0" g="0" b="0"/>
+      </a:lnRef>
+      <a:fillRef idx="1">
+        <a:scrgbClr r="0" g="0" b="0"/>
+      </a:fillRef>
+      <a:effectRef idx="0">
+        <a:scrgbClr r="0" g="0" b="0"/>
+      </a:effectRef>
+      <a:fontRef idx="minor"/>
+    </dgm:style>
+  </dgm:styleLbl>
+  <dgm:styleLbl name="fgAcc2">
+    <dgm:scene3d>
+      <a:camera prst="orthographicFront"/>
+      <a:lightRig rig="threePt" dir="t"/>
+    </dgm:scene3d>
+    <dgm:sp3d/>
+    <dgm:txPr/>
+    <dgm:style>
+      <a:lnRef idx="2">
+        <a:scrgbClr r="0" g="0" b="0"/>
+      </a:lnRef>
+      <a:fillRef idx="1">
+        <a:scrgbClr r="0" g="0" b="0"/>
+      </a:fillRef>
+      <a:effectRef idx="0">
+        <a:scrgbClr r="0" g="0" b="0"/>
+      </a:effectRef>
+      <a:fontRef idx="minor"/>
+    </dgm:style>
+  </dgm:styleLbl>
+  <dgm:styleLbl name="fgAcc3">
+    <dgm:scene3d>
+      <a:camera prst="orthographicFront"/>
+      <a:lightRig rig="threePt" dir="t"/>
+    </dgm:scene3d>
+    <dgm:sp3d/>
+    <dgm:txPr/>
+    <dgm:style>
+      <a:lnRef idx="2">
+        <a:scrgbClr r="0" g="0" b="0"/>
+      </a:lnRef>
+      <a:fillRef idx="1">
+        <a:scrgbClr r="0" g="0" b="0"/>
+      </a:fillRef>
+      <a:effectRef idx="0">
+        <a:scrgbClr r="0" g="0" b="0"/>
+      </a:effectRef>
+      <a:fontRef idx="minor"/>
+    </dgm:style>
+  </dgm:styleLbl>
+  <dgm:styleLbl name="fgAcc4">
+    <dgm:scene3d>
+      <a:camera prst="orthographicFront"/>
+      <a:lightRig rig="threePt" dir="t"/>
+    </dgm:scene3d>
+    <dgm:sp3d/>
+    <dgm:txPr/>
+    <dgm:style>
+      <a:lnRef idx="2">
+        <a:scrgbClr r="0" g="0" b="0"/>
+      </a:lnRef>
+      <a:fillRef idx="1">
+        <a:scrgbClr r="0" g="0" b="0"/>
+      </a:fillRef>
+      <a:effectRef idx="0">
+        <a:scrgbClr r="0" g="0" b="0"/>
+      </a:effectRef>
+      <a:fontRef idx="minor"/>
+    </dgm:style>
+  </dgm:styleLbl>
+  <dgm:styleLbl name="bgShp">
+    <dgm:scene3d>
+      <a:camera prst="orthographicFront"/>
+      <a:lightRig rig="threePt" dir="t"/>
+    </dgm:scene3d>
+    <dgm:sp3d/>
+    <dgm:txPr/>
+    <dgm:style>
+      <a:lnRef idx="0">
+        <a:scrgbClr r="0" g="0" b="0"/>
+      </a:lnRef>
+      <a:fillRef idx="1">
+        <a:scrgbClr r="0" g="0" b="0"/>
+      </a:fillRef>
+      <a:effectRef idx="0">
+        <a:scrgbClr r="0" g="0" b="0"/>
+      </a:effectRef>
+      <a:fontRef idx="minor"/>
+    </dgm:style>
+  </dgm:styleLbl>
+  <dgm:styleLbl name="dkBgShp">
+    <dgm:scene3d>
+      <a:camera prst="orthographicFront"/>
+      <a:lightRig rig="threePt" dir="t"/>
+    </dgm:scene3d>
+    <dgm:sp3d/>
+    <dgm:txPr/>
+    <dgm:style>
+      <a:lnRef idx="0">
+        <a:scrgbClr r="0" g="0" b="0"/>
+      </a:lnRef>
+      <a:fillRef idx="1">
+        <a:scrgbClr r="0" g="0" b="0"/>
+      </a:fillRef>
+      <a:effectRef idx="0">
+        <a:scrgbClr r="0" g="0" b="0"/>
+      </a:effectRef>
+      <a:fontRef idx="minor"/>
+    </dgm:style>
+  </dgm:styleLbl>
+  <dgm:styleLbl name="trBgShp">
+    <dgm:scene3d>
+      <a:camera prst="orthographicFront"/>
+      <a:lightRig rig="threePt" dir="t"/>
+    </dgm:scene3d>
+    <dgm:sp3d/>
+    <dgm:txPr/>
+    <dgm:style>
+      <a:lnRef idx="0">
+        <a:scrgbClr r="0" g="0" b="0"/>
+      </a:lnRef>
+      <a:fillRef idx="1">
+        <a:scrgbClr r="0" g="0" b="0"/>
+      </a:fillRef>
+      <a:effectRef idx="0">
+        <a:scrgbClr r="0" g="0" b="0"/>
+      </a:effectRef>
+      <a:fontRef idx="minor"/>
+    </dgm:style>
+  </dgm:styleLbl>
+  <dgm:styleLbl name="fgShp">
+    <dgm:scene3d>
+      <a:camera prst="orthographicFront"/>
+      <a:lightRig rig="threePt" dir="t"/>
+    </dgm:scene3d>
+    <dgm:sp3d/>
+    <dgm:txPr/>
+    <dgm:style>
+      <a:lnRef idx="2">
+        <a:scrgbClr r="0" g="0" b="0"/>
+      </a:lnRef>
+      <a:fillRef idx="1">
+        <a:scrgbClr r="0" g="0" b="0"/>
+      </a:fillRef>
+      <a:effectRef idx="0">
+        <a:scrgbClr r="0" g="0" b="0"/>
+      </a:effectRef>
+      <a:fontRef idx="minor"/>
+    </dgm:style>
+  </dgm:styleLbl>
+  <dgm:styleLbl name="revTx">
+    <dgm:scene3d>
+      <a:camera prst="orthographicFront"/>
+      <a:lightRig rig="threePt" dir="t"/>
+    </dgm:scene3d>
+    <dgm:sp3d/>
+    <dgm:txPr/>
+    <dgm:style>
+      <a:lnRef idx="0">
+        <a:scrgbClr r="0" g="0" b="0"/>
+      </a:lnRef>
+      <a:fillRef idx="0">
+        <a:scrgbClr r="0" g="0" b="0"/>
+      </a:fillRef>
+      <a:effectRef idx="0">
+        <a:scrgbClr r="0" g="0" b="0"/>
+      </a:effectRef>
+      <a:fontRef idx="minor"/>
+    </dgm:style>
+  </dgm:styleLbl>
+</dgm:styleDef>
+</file>
+
+<file path=ppt/diagrams/quickStyle3.xml><?xml version="1.0" encoding="utf-8"?>
 <dgm:styleDef xmlns:dgm="http://schemas.openxmlformats.org/drawingml/2006/diagram" xmlns:a="http://schemas.openxmlformats.org/drawingml/2006/main" uniqueId="urn:microsoft.com/office/officeart/2005/8/quickstyle/simple1">
   <dgm:title val=""/>
   <dgm:desc val=""/>
@@ -13529,6 +16056,13 @@
   <p:clrMapOvr>
     <a:masterClrMapping/>
   </p:clrMapOvr>
+  <p:timing>
+    <p:tnLst>
+      <p:par>
+        <p:cTn id="1" dur="indefinite" restart="never" nodeType="tmRoot"/>
+      </p:par>
+    </p:tnLst>
+  </p:timing>
 </p:sld>
 </file>
 
@@ -13601,6 +16135,13 @@
   <p:clrMapOvr>
     <a:masterClrMapping/>
   </p:clrMapOvr>
+  <p:timing>
+    <p:tnLst>
+      <p:par>
+        <p:cTn id="1" dur="indefinite" restart="never" nodeType="tmRoot"/>
+      </p:par>
+    </p:tnLst>
+  </p:timing>
 </p:sld>
 </file>
 
@@ -13667,10 +16208,58 @@
           <a:bodyPr/>
           <a:lstStyle/>
           <a:p>
-            <a:endParaRPr lang="en-GB"/>
+            <a:r>
+              <a:rPr lang="en-GB" dirty="0" smtClean="0"/>
+              <a:t>When the </a:t>
+            </a:r>
+            <a:r>
+              <a:rPr lang="en-GB" dirty="0" err="1" smtClean="0"/>
+              <a:t>tabu</a:t>
+            </a:r>
+            <a:r>
+              <a:rPr lang="en-GB" dirty="0" smtClean="0"/>
+              <a:t> search starts, it takes as initial solution the best chromosome found by the genetic algorithm.</a:t>
+            </a:r>
+          </a:p>
+          <a:p>
+            <a:r>
+              <a:rPr lang="en-GB" dirty="0" smtClean="0"/>
+              <a:t>The chromosome is then converted into a suitable initial solution for the </a:t>
+            </a:r>
+            <a:r>
+              <a:rPr lang="en-GB" dirty="0" err="1" smtClean="0"/>
+              <a:t>tabu</a:t>
+            </a:r>
+            <a:r>
+              <a:rPr lang="en-GB" dirty="0" smtClean="0"/>
+              <a:t> search algorithm.</a:t>
+            </a:r>
+            <a:endParaRPr lang="en-GB" dirty="0"/>
           </a:p>
         </p:txBody>
       </p:sp>
+      <p:graphicFrame>
+        <p:nvGraphicFramePr>
+          <p:cNvPr id="4" name="Diagramma 3"/>
+          <p:cNvGraphicFramePr/>
+          <p:nvPr>
+            <p:extLst>
+              <p:ext uri="{D42A27DB-BD31-4B8C-83A1-F6EECF244321}">
+                <p14:modId xmlns:p14="http://schemas.microsoft.com/office/powerpoint/2010/main" val="3114073721"/>
+              </p:ext>
+            </p:extLst>
+          </p:nvPr>
+        </p:nvGraphicFramePr>
+        <p:xfrm>
+          <a:off x="1259632" y="2924944"/>
+          <a:ext cx="6096000" cy="4064000"/>
+        </p:xfrm>
+        <a:graphic>
+          <a:graphicData uri="http://schemas.openxmlformats.org/drawingml/2006/diagram">
+            <dgm:relIds xmlns:dgm="http://schemas.openxmlformats.org/drawingml/2006/diagram" xmlns:r="http://schemas.openxmlformats.org/officeDocument/2006/relationships" r:dm="rId2" r:lo="rId3" r:qs="rId4" r:cs="rId5"/>
+          </a:graphicData>
+        </a:graphic>
+      </p:graphicFrame>
     </p:spTree>
     <p:extLst>
       <p:ext uri="{BB962C8B-B14F-4D97-AF65-F5344CB8AC3E}">
@@ -13681,6 +16270,13 @@
   <p:clrMapOvr>
     <a:masterClrMapping/>
   </p:clrMapOvr>
+  <p:timing>
+    <p:tnLst>
+      <p:par>
+        <p:cTn id="1" dur="indefinite" restart="never" nodeType="tmRoot"/>
+      </p:par>
+    </p:tnLst>
+  </p:timing>
 </p:sld>
 </file>
 
@@ -14225,6 +16821,13 @@
   <p:clrMapOvr>
     <a:masterClrMapping/>
   </p:clrMapOvr>
+  <p:timing>
+    <p:tnLst>
+      <p:par>
+        <p:cTn id="1" dur="indefinite" restart="never" nodeType="tmRoot"/>
+      </p:par>
+    </p:tnLst>
+  </p:timing>
 </p:sld>
 </file>
 
@@ -14297,6 +16900,13 @@
   <p:clrMapOvr>
     <a:masterClrMapping/>
   </p:clrMapOvr>
+  <p:timing>
+    <p:tnLst>
+      <p:par>
+        <p:cTn id="1" dur="indefinite" restart="never" nodeType="tmRoot"/>
+      </p:par>
+    </p:tnLst>
+  </p:timing>
 </p:sld>
 </file>
 
@@ -14629,20 +17239,12 @@
               <a:t>Local </a:t>
             </a:r>
             <a:r>
-              <a:rPr lang="it-IT" dirty="0" err="1" smtClean="0"/>
-              <a:t>search</a:t>
-            </a:r>
-            <a:r>
-              <a:rPr lang="it-IT" dirty="0"/>
-              <a:t> </a:t>
-            </a:r>
-            <a:r>
-              <a:rPr lang="it-IT" dirty="0" err="1" smtClean="0"/>
-              <a:t>that</a:t>
+              <a:rPr lang="it-IT" smtClean="0"/>
+              <a:t>search </a:t>
             </a:r>
             <a:r>
               <a:rPr lang="it-IT" dirty="0" smtClean="0"/>
-              <a:t> – Tabu </a:t>
+              <a:t>– Tabu </a:t>
             </a:r>
             <a:r>
               <a:rPr lang="it-IT" dirty="0" err="1" smtClean="0"/>
@@ -15303,6 +17905,13 @@
   <p:clrMapOvr>
     <a:masterClrMapping/>
   </p:clrMapOvr>
+  <p:timing>
+    <p:tnLst>
+      <p:par>
+        <p:cTn id="1" dur="indefinite" restart="never" nodeType="tmRoot"/>
+      </p:par>
+    </p:tnLst>
+  </p:timing>
 </p:sld>
 </file>
 
@@ -15397,6 +18006,13 @@
   <p:clrMapOvr>
     <a:masterClrMapping/>
   </p:clrMapOvr>
+  <p:timing>
+    <p:tnLst>
+      <p:par>
+        <p:cTn id="1" dur="indefinite" restart="never" nodeType="tmRoot"/>
+      </p:par>
+    </p:tnLst>
+  </p:timing>
 </p:sld>
 </file>
 

</xml_diff>